<commit_message>
Update APLIKASI CATALOG BOARD GAMES.pptx
</commit_message>
<xml_diff>
--- a/APLIKASI CATALOG BOARD GAMES.pptx
+++ b/APLIKASI CATALOG BOARD GAMES.pptx
@@ -7,17 +7,18 @@
   <p:sldIdLst>
     <p:sldId id="257" r:id="rId2"/>
     <p:sldId id="259" r:id="rId3"/>
-    <p:sldId id="260" r:id="rId4"/>
-    <p:sldId id="261" r:id="rId5"/>
-    <p:sldId id="262" r:id="rId6"/>
-    <p:sldId id="264" r:id="rId7"/>
-    <p:sldId id="263" r:id="rId8"/>
-    <p:sldId id="265" r:id="rId9"/>
-    <p:sldId id="266" r:id="rId10"/>
-    <p:sldId id="267" r:id="rId11"/>
-    <p:sldId id="268" r:id="rId12"/>
-    <p:sldId id="269" r:id="rId13"/>
-    <p:sldId id="270" r:id="rId14"/>
+    <p:sldId id="271" r:id="rId4"/>
+    <p:sldId id="260" r:id="rId5"/>
+    <p:sldId id="261" r:id="rId6"/>
+    <p:sldId id="262" r:id="rId7"/>
+    <p:sldId id="264" r:id="rId8"/>
+    <p:sldId id="263" r:id="rId9"/>
+    <p:sldId id="265" r:id="rId10"/>
+    <p:sldId id="266" r:id="rId11"/>
+    <p:sldId id="267" r:id="rId12"/>
+    <p:sldId id="268" r:id="rId13"/>
+    <p:sldId id="269" r:id="rId14"/>
+    <p:sldId id="270" r:id="rId15"/>
   </p:sldIdLst>
   <p:sldSz cx="12192000" cy="6858000"/>
   <p:notesSz cx="6858000" cy="9144000"/>
@@ -116,6 +117,11 @@
       </a:defRPr>
     </a:lvl9pPr>
   </p:defaultTextStyle>
+  <p:extLst>
+    <p:ext uri="{EFAFB233-063F-42B5-8137-9DF3F51BA10A}">
+      <p15:sldGuideLst xmlns:p15="http://schemas.microsoft.com/office/powerpoint/2012/main"/>
+    </p:ext>
+  </p:extLst>
 </p:presentation>
 </file>
 
@@ -268,7 +274,7 @@
           <a:p>
             <a:fld id="{B33E033C-84D7-4C81-BFF1-0F289B167355}" type="datetimeFigureOut">
               <a:rPr lang="id-ID" smtClean="0"/>
-              <a:t>30/06/2021</a:t>
+              <a:t>07/07/2021</a:t>
             </a:fld>
             <a:endParaRPr lang="id-ID"/>
           </a:p>
@@ -468,7 +474,7 @@
           <a:p>
             <a:fld id="{B33E033C-84D7-4C81-BFF1-0F289B167355}" type="datetimeFigureOut">
               <a:rPr lang="id-ID" smtClean="0"/>
-              <a:t>30/06/2021</a:t>
+              <a:t>07/07/2021</a:t>
             </a:fld>
             <a:endParaRPr lang="id-ID"/>
           </a:p>
@@ -678,7 +684,7 @@
           <a:p>
             <a:fld id="{B33E033C-84D7-4C81-BFF1-0F289B167355}" type="datetimeFigureOut">
               <a:rPr lang="id-ID" smtClean="0"/>
-              <a:t>30/06/2021</a:t>
+              <a:t>07/07/2021</a:t>
             </a:fld>
             <a:endParaRPr lang="id-ID"/>
           </a:p>
@@ -878,7 +884,7 @@
           <a:p>
             <a:fld id="{B33E033C-84D7-4C81-BFF1-0F289B167355}" type="datetimeFigureOut">
               <a:rPr lang="id-ID" smtClean="0"/>
-              <a:t>30/06/2021</a:t>
+              <a:t>07/07/2021</a:t>
             </a:fld>
             <a:endParaRPr lang="id-ID"/>
           </a:p>
@@ -1154,7 +1160,7 @@
           <a:p>
             <a:fld id="{B33E033C-84D7-4C81-BFF1-0F289B167355}" type="datetimeFigureOut">
               <a:rPr lang="id-ID" smtClean="0"/>
-              <a:t>30/06/2021</a:t>
+              <a:t>07/07/2021</a:t>
             </a:fld>
             <a:endParaRPr lang="id-ID"/>
           </a:p>
@@ -1422,7 +1428,7 @@
           <a:p>
             <a:fld id="{B33E033C-84D7-4C81-BFF1-0F289B167355}" type="datetimeFigureOut">
               <a:rPr lang="id-ID" smtClean="0"/>
-              <a:t>30/06/2021</a:t>
+              <a:t>07/07/2021</a:t>
             </a:fld>
             <a:endParaRPr lang="id-ID"/>
           </a:p>
@@ -1837,7 +1843,7 @@
           <a:p>
             <a:fld id="{B33E033C-84D7-4C81-BFF1-0F289B167355}" type="datetimeFigureOut">
               <a:rPr lang="id-ID" smtClean="0"/>
-              <a:t>30/06/2021</a:t>
+              <a:t>07/07/2021</a:t>
             </a:fld>
             <a:endParaRPr lang="id-ID"/>
           </a:p>
@@ -1979,7 +1985,7 @@
           <a:p>
             <a:fld id="{B33E033C-84D7-4C81-BFF1-0F289B167355}" type="datetimeFigureOut">
               <a:rPr lang="id-ID" smtClean="0"/>
-              <a:t>30/06/2021</a:t>
+              <a:t>07/07/2021</a:t>
             </a:fld>
             <a:endParaRPr lang="id-ID"/>
           </a:p>
@@ -2092,7 +2098,7 @@
           <a:p>
             <a:fld id="{B33E033C-84D7-4C81-BFF1-0F289B167355}" type="datetimeFigureOut">
               <a:rPr lang="id-ID" smtClean="0"/>
-              <a:t>30/06/2021</a:t>
+              <a:t>07/07/2021</a:t>
             </a:fld>
             <a:endParaRPr lang="id-ID"/>
           </a:p>
@@ -2405,7 +2411,7 @@
           <a:p>
             <a:fld id="{B33E033C-84D7-4C81-BFF1-0F289B167355}" type="datetimeFigureOut">
               <a:rPr lang="id-ID" smtClean="0"/>
-              <a:t>30/06/2021</a:t>
+              <a:t>07/07/2021</a:t>
             </a:fld>
             <a:endParaRPr lang="id-ID"/>
           </a:p>
@@ -2694,7 +2700,7 @@
           <a:p>
             <a:fld id="{B33E033C-84D7-4C81-BFF1-0F289B167355}" type="datetimeFigureOut">
               <a:rPr lang="id-ID" smtClean="0"/>
-              <a:t>30/06/2021</a:t>
+              <a:t>07/07/2021</a:t>
             </a:fld>
             <a:endParaRPr lang="id-ID"/>
           </a:p>
@@ -2937,7 +2943,7 @@
           <a:p>
             <a:fld id="{B33E033C-84D7-4C81-BFF1-0F289B167355}" type="datetimeFigureOut">
               <a:rPr lang="id-ID" smtClean="0"/>
-              <a:t>30/06/2021</a:t>
+              <a:t>07/07/2021</a:t>
             </a:fld>
             <a:endParaRPr lang="id-ID"/>
           </a:p>
@@ -3354,6 +3360,42 @@
           <a:chExt cx="0" cy="0"/>
         </a:xfrm>
       </p:grpSpPr>
+      <p:pic>
+        <p:nvPicPr>
+          <p:cNvPr id="5" name="Picture 4">
+            <a:extLst>
+              <a:ext uri="{FF2B5EF4-FFF2-40B4-BE49-F238E27FC236}">
+                <a16:creationId xmlns:a16="http://schemas.microsoft.com/office/drawing/2014/main" id="{14EFF41C-F19B-4703-823F-B19719C8F1F1}"/>
+              </a:ext>
+            </a:extLst>
+          </p:cNvPr>
+          <p:cNvPicPr>
+            <a:picLocks noChangeAspect="1"/>
+          </p:cNvPicPr>
+          <p:nvPr/>
+        </p:nvPicPr>
+        <p:blipFill>
+          <a:blip r:embed="rId2">
+            <a:extLst>
+              <a:ext uri="{28A0092B-C50C-407E-A947-70E740481C1C}">
+                <a14:useLocalDpi xmlns:a14="http://schemas.microsoft.com/office/drawing/2010/main" val="0"/>
+              </a:ext>
+            </a:extLst>
+          </a:blip>
+          <a:stretch>
+            <a:fillRect/>
+          </a:stretch>
+        </p:blipFill>
+        <p:spPr>
+          <a:xfrm>
+            <a:off x="5025886" y="2424544"/>
+            <a:ext cx="2140227" cy="1836179"/>
+          </a:xfrm>
+          <a:prstGeom prst="rect">
+            <a:avLst/>
+          </a:prstGeom>
+        </p:spPr>
+      </p:pic>
       <p:sp>
         <p:nvSpPr>
           <p:cNvPr id="2" name="Title 1"/>
@@ -3425,8 +3467,8 @@
         </p:nvSpPr>
         <p:spPr>
           <a:xfrm>
-            <a:off x="1704512" y="2881747"/>
-            <a:ext cx="8963487" cy="3103418"/>
+            <a:off x="1704513" y="4433456"/>
+            <a:ext cx="8963487" cy="796034"/>
           </a:xfrm>
         </p:spPr>
         <p:txBody>
@@ -3488,7 +3530,7 @@
           <p:cNvPr id="2" name="Title 1">
             <a:extLst>
               <a:ext uri="{FF2B5EF4-FFF2-40B4-BE49-F238E27FC236}">
-                <a16:creationId xmlns:a16="http://schemas.microsoft.com/office/drawing/2014/main" id="{240764FF-DBE6-4B73-A4B3-FE779E4156FE}"/>
+                <a16:creationId xmlns:a16="http://schemas.microsoft.com/office/drawing/2014/main" id="{0C58EE55-CA71-40DA-8938-97EEC1C58105}"/>
               </a:ext>
             </a:extLst>
           </p:cNvPr>
@@ -3505,8 +3547,12 @@
           <a:lstStyle/>
           <a:p>
             <a:r>
-              <a:rPr lang="en-US" dirty="0"/>
-              <a:t>Edit User</a:t>
+              <a:rPr lang="en-US" dirty="0" err="1"/>
+              <a:t>Tambah</a:t>
+            </a:r>
+            <a:r>
+              <a:rPr lang="en-US" dirty="0"/>
+              <a:t> History</a:t>
             </a:r>
             <a:endParaRPr lang="id-ID" dirty="0"/>
           </a:p>
@@ -3517,7 +3563,7 @@
           <p:cNvPr id="3" name="Content Placeholder 2">
             <a:extLst>
               <a:ext uri="{FF2B5EF4-FFF2-40B4-BE49-F238E27FC236}">
-                <a16:creationId xmlns:a16="http://schemas.microsoft.com/office/drawing/2014/main" id="{08F088E5-24E5-47EC-9D56-A46E52BD37DD}"/>
+                <a16:creationId xmlns:a16="http://schemas.microsoft.com/office/drawing/2014/main" id="{2A27E5A2-8C7F-4D24-A103-E655C4074461}"/>
               </a:ext>
             </a:extLst>
           </p:cNvPr>
@@ -3528,55 +3574,358 @@
             <p:ph idx="1"/>
           </p:nvPr>
         </p:nvSpPr>
-        <p:spPr/>
-        <p:txBody>
-          <a:bodyPr/>
+        <p:spPr>
+          <a:xfrm>
+            <a:off x="838200" y="1825625"/>
+            <a:ext cx="8105274" cy="4351338"/>
+          </a:xfrm>
+        </p:spPr>
+        <p:txBody>
+          <a:bodyPr>
+            <a:normAutofit lnSpcReduction="10000"/>
+          </a:bodyPr>
           <a:lstStyle/>
           <a:p>
             <a:r>
               <a:rPr lang="en-US" dirty="0" err="1"/>
-              <a:t>Digunakan</a:t>
-            </a:r>
-            <a:r>
-              <a:rPr lang="en-US" dirty="0"/>
-              <a:t> </a:t>
-            </a:r>
-            <a:r>
-              <a:rPr lang="en-US" dirty="0" err="1"/>
-              <a:t>untuk</a:t>
-            </a:r>
-            <a:r>
-              <a:rPr lang="en-US" dirty="0"/>
-              <a:t> </a:t>
-            </a:r>
-            <a:r>
-              <a:rPr lang="en-US" dirty="0" err="1"/>
-              <a:t>mengubah</a:t>
-            </a:r>
-            <a:r>
-              <a:rPr lang="en-US" dirty="0"/>
-              <a:t> data user yang </a:t>
-            </a:r>
-            <a:r>
-              <a:rPr lang="en-US" dirty="0" err="1"/>
-              <a:t>sudah</a:t>
-            </a:r>
-            <a:r>
-              <a:rPr lang="en-US" dirty="0"/>
-              <a:t> </a:t>
-            </a:r>
-            <a:r>
-              <a:rPr lang="en-US" dirty="0" err="1"/>
-              <a:t>dibuat</a:t>
+              <a:t>Tambah</a:t>
+            </a:r>
+            <a:r>
+              <a:rPr lang="en-US" dirty="0"/>
+              <a:t> history </a:t>
+            </a:r>
+            <a:r>
+              <a:rPr lang="en-US" dirty="0" err="1"/>
+              <a:t>hanya</a:t>
+            </a:r>
+            <a:r>
+              <a:rPr lang="en-US" dirty="0"/>
+              <a:t> </a:t>
+            </a:r>
+            <a:r>
+              <a:rPr lang="en-US" dirty="0" err="1"/>
+              <a:t>ada</a:t>
+            </a:r>
+            <a:r>
+              <a:rPr lang="en-US" dirty="0"/>
+              <a:t> pada </a:t>
+            </a:r>
+            <a:r>
+              <a:rPr lang="en-US" dirty="0" err="1"/>
+              <a:t>akses</a:t>
+            </a:r>
+            <a:r>
+              <a:rPr lang="en-US" dirty="0"/>
+              <a:t> level </a:t>
+            </a:r>
+            <a:r>
+              <a:rPr lang="id-ID" dirty="0"/>
+              <a:t>client</a:t>
+            </a:r>
+            <a:endParaRPr lang="en-US" dirty="0"/>
+          </a:p>
+          <a:p>
+            <a:r>
+              <a:rPr lang="en-US" dirty="0" err="1"/>
+              <a:t>Dapat</a:t>
+            </a:r>
+            <a:r>
+              <a:rPr lang="en-US" dirty="0"/>
+              <a:t> </a:t>
+            </a:r>
+            <a:r>
+              <a:rPr lang="en-US" dirty="0" err="1"/>
+              <a:t>diakses</a:t>
+            </a:r>
+            <a:r>
+              <a:rPr lang="en-US" dirty="0"/>
+              <a:t> </a:t>
+            </a:r>
+            <a:r>
+              <a:rPr lang="en-US" dirty="0" err="1"/>
+              <a:t>melalui</a:t>
+            </a:r>
+            <a:r>
+              <a:rPr lang="en-US" dirty="0"/>
+              <a:t> detail game</a:t>
+            </a:r>
+          </a:p>
+          <a:p>
+            <a:r>
+              <a:rPr lang="en-US" dirty="0"/>
+              <a:t>Isi </a:t>
+            </a:r>
+            <a:r>
+              <a:rPr lang="en-US" dirty="0" err="1"/>
+              <a:t>dari</a:t>
+            </a:r>
+            <a:r>
+              <a:rPr lang="en-US" dirty="0"/>
+              <a:t> </a:t>
+            </a:r>
+            <a:r>
+              <a:rPr lang="en-US" dirty="0" err="1"/>
+              <a:t>tambah</a:t>
+            </a:r>
+            <a:r>
+              <a:rPr lang="en-US" dirty="0"/>
+              <a:t> history </a:t>
+            </a:r>
+            <a:r>
+              <a:rPr lang="en-US" dirty="0" err="1"/>
+              <a:t>adalah</a:t>
+            </a:r>
+            <a:r>
+              <a:rPr lang="en-US" dirty="0"/>
+              <a:t> data </a:t>
+            </a:r>
+            <a:r>
+              <a:rPr lang="en-US" dirty="0" err="1"/>
+              <a:t>dari</a:t>
+            </a:r>
+            <a:r>
+              <a:rPr lang="en-US" dirty="0"/>
+              <a:t> history </a:t>
+            </a:r>
+            <a:r>
+              <a:rPr lang="en-US" dirty="0" err="1"/>
+              <a:t>permainan</a:t>
+            </a:r>
+            <a:r>
+              <a:rPr lang="en-US" dirty="0"/>
+              <a:t> yang </a:t>
+            </a:r>
+            <a:r>
+              <a:rPr lang="en-US" dirty="0" err="1"/>
+              <a:t>dilakukan</a:t>
+            </a:r>
+            <a:endParaRPr lang="en-US" dirty="0"/>
+          </a:p>
+          <a:p>
+            <a:r>
+              <a:rPr lang="en-US" dirty="0" err="1"/>
+              <a:t>Terdapat</a:t>
+            </a:r>
+            <a:r>
+              <a:rPr lang="en-US" dirty="0"/>
+              <a:t> upload </a:t>
+            </a:r>
+            <a:r>
+              <a:rPr lang="en-US" dirty="0" err="1"/>
+              <a:t>gambar</a:t>
+            </a:r>
+            <a:r>
+              <a:rPr lang="en-US" dirty="0"/>
+              <a:t> yang </a:t>
+            </a:r>
+            <a:r>
+              <a:rPr lang="en-US" dirty="0" err="1"/>
+              <a:t>digunakan</a:t>
+            </a:r>
+            <a:r>
+              <a:rPr lang="en-US" dirty="0"/>
+              <a:t> </a:t>
+            </a:r>
+            <a:r>
+              <a:rPr lang="en-US" dirty="0" err="1"/>
+              <a:t>sebagai</a:t>
+            </a:r>
+            <a:r>
+              <a:rPr lang="en-US" dirty="0"/>
+              <a:t> </a:t>
+            </a:r>
+            <a:r>
+              <a:rPr lang="en-US" dirty="0" err="1"/>
+              <a:t>bukti</a:t>
+            </a:r>
+            <a:r>
+              <a:rPr lang="en-US" dirty="0"/>
+              <a:t> </a:t>
+            </a:r>
+            <a:r>
+              <a:rPr lang="en-US" dirty="0" err="1"/>
+              <a:t>kebenaran</a:t>
+            </a:r>
+            <a:endParaRPr lang="en-US" dirty="0"/>
+          </a:p>
+          <a:p>
+            <a:r>
+              <a:rPr lang="en-US" dirty="0"/>
+              <a:t>Setelah </a:t>
+            </a:r>
+            <a:r>
+              <a:rPr lang="en-US" dirty="0" err="1"/>
+              <a:t>diklik</a:t>
+            </a:r>
+            <a:r>
+              <a:rPr lang="en-US" dirty="0"/>
+              <a:t> </a:t>
+            </a:r>
+            <a:r>
+              <a:rPr lang="en-US" dirty="0" err="1"/>
+              <a:t>maka</a:t>
+            </a:r>
+            <a:r>
+              <a:rPr lang="en-US" dirty="0"/>
+              <a:t> </a:t>
+            </a:r>
+            <a:r>
+              <a:rPr lang="en-US" dirty="0" err="1"/>
+              <a:t>akan</a:t>
+            </a:r>
+            <a:r>
+              <a:rPr lang="en-US" dirty="0"/>
+              <a:t> </a:t>
+            </a:r>
+            <a:r>
+              <a:rPr lang="en-US" dirty="0" err="1"/>
+              <a:t>dialihkan</a:t>
+            </a:r>
+            <a:r>
+              <a:rPr lang="en-US" dirty="0"/>
+              <a:t> </a:t>
+            </a:r>
+            <a:r>
+              <a:rPr lang="en-US" dirty="0" err="1"/>
+              <a:t>menuju</a:t>
+            </a:r>
+            <a:r>
+              <a:rPr lang="en-US" dirty="0"/>
+              <a:t> leaderboard</a:t>
+            </a:r>
+          </a:p>
+          <a:p>
+            <a:r>
+              <a:rPr lang="en-US" dirty="0"/>
+              <a:t>Setelah </a:t>
+            </a:r>
+            <a:r>
+              <a:rPr lang="en-US" dirty="0" err="1"/>
+              <a:t>tambah</a:t>
+            </a:r>
+            <a:r>
+              <a:rPr lang="en-US" dirty="0"/>
+              <a:t> history </a:t>
+            </a:r>
+            <a:r>
+              <a:rPr lang="en-US" dirty="0" err="1"/>
+              <a:t>maka</a:t>
+            </a:r>
+            <a:r>
+              <a:rPr lang="en-US" dirty="0"/>
+              <a:t> admin </a:t>
+            </a:r>
+            <a:r>
+              <a:rPr lang="en-US" dirty="0" err="1"/>
+              <a:t>dapat</a:t>
+            </a:r>
+            <a:r>
+              <a:rPr lang="en-US" dirty="0"/>
+              <a:t> </a:t>
+            </a:r>
+            <a:r>
+              <a:rPr lang="en-US" dirty="0" err="1"/>
+              <a:t>menyetujui</a:t>
+            </a:r>
+            <a:r>
+              <a:rPr lang="en-US" dirty="0"/>
+              <a:t> </a:t>
+            </a:r>
+            <a:r>
+              <a:rPr lang="en-US" dirty="0" err="1"/>
+              <a:t>ataupun</a:t>
+            </a:r>
+            <a:r>
+              <a:rPr lang="en-US" dirty="0"/>
+              <a:t> </a:t>
+            </a:r>
+            <a:r>
+              <a:rPr lang="en-US" dirty="0" err="1"/>
+              <a:t>menolak</a:t>
+            </a:r>
+            <a:r>
+              <a:rPr lang="en-US" dirty="0"/>
+              <a:t> history</a:t>
             </a:r>
             <a:endParaRPr lang="id-ID" dirty="0"/>
           </a:p>
         </p:txBody>
       </p:sp>
+      <p:pic>
+        <p:nvPicPr>
+          <p:cNvPr id="5" name="Picture 4">
+            <a:extLst>
+              <a:ext uri="{FF2B5EF4-FFF2-40B4-BE49-F238E27FC236}">
+                <a16:creationId xmlns:a16="http://schemas.microsoft.com/office/drawing/2014/main" id="{FFEA9E68-E006-41A0-82FB-39AAA9D928EA}"/>
+              </a:ext>
+            </a:extLst>
+          </p:cNvPr>
+          <p:cNvPicPr>
+            <a:picLocks noChangeAspect="1"/>
+          </p:cNvPicPr>
+          <p:nvPr/>
+        </p:nvPicPr>
+        <p:blipFill>
+          <a:blip r:embed="rId2">
+            <a:extLst>
+              <a:ext uri="{28A0092B-C50C-407E-A947-70E740481C1C}">
+                <a14:useLocalDpi xmlns:a14="http://schemas.microsoft.com/office/drawing/2010/main" val="0"/>
+              </a:ext>
+            </a:extLst>
+          </a:blip>
+          <a:stretch>
+            <a:fillRect/>
+          </a:stretch>
+        </p:blipFill>
+        <p:spPr>
+          <a:xfrm>
+            <a:off x="8957541" y="0"/>
+            <a:ext cx="3248526" cy="5584874"/>
+          </a:xfrm>
+          <a:prstGeom prst="rect">
+            <a:avLst/>
+          </a:prstGeom>
+        </p:spPr>
+      </p:pic>
+      <p:pic>
+        <p:nvPicPr>
+          <p:cNvPr id="9" name="Picture 8">
+            <a:extLst>
+              <a:ext uri="{FF2B5EF4-FFF2-40B4-BE49-F238E27FC236}">
+                <a16:creationId xmlns:a16="http://schemas.microsoft.com/office/drawing/2014/main" id="{A0D75EAB-6373-4725-A5F6-3AECA585DAF3}"/>
+              </a:ext>
+            </a:extLst>
+          </p:cNvPr>
+          <p:cNvPicPr>
+            <a:picLocks noChangeAspect="1"/>
+          </p:cNvPicPr>
+          <p:nvPr/>
+        </p:nvPicPr>
+        <p:blipFill rotWithShape="1">
+          <a:blip r:embed="rId3">
+            <a:extLst>
+              <a:ext uri="{28A0092B-C50C-407E-A947-70E740481C1C}">
+                <a14:useLocalDpi xmlns:a14="http://schemas.microsoft.com/office/drawing/2010/main" val="0"/>
+              </a:ext>
+            </a:extLst>
+          </a:blip>
+          <a:srcRect t="60334" b="627"/>
+          <a:stretch/>
+        </p:blipFill>
+        <p:spPr>
+          <a:xfrm>
+            <a:off x="8957541" y="4878000"/>
+            <a:ext cx="3234459" cy="1980000"/>
+          </a:xfrm>
+          <a:prstGeom prst="rect">
+            <a:avLst/>
+          </a:prstGeom>
+        </p:spPr>
+      </p:pic>
     </p:spTree>
     <p:extLst>
       <p:ext uri="{BB962C8B-B14F-4D97-AF65-F5344CB8AC3E}">
-        <p14:creationId xmlns:p14="http://schemas.microsoft.com/office/powerpoint/2010/main" val="3953751072"/>
+        <p14:creationId xmlns:p14="http://schemas.microsoft.com/office/powerpoint/2010/main" val="3757181856"/>
       </p:ext>
     </p:extLst>
   </p:cSld>
@@ -3608,7 +3957,7 @@
           <p:cNvPr id="2" name="Title 1">
             <a:extLst>
               <a:ext uri="{FF2B5EF4-FFF2-40B4-BE49-F238E27FC236}">
-                <a16:creationId xmlns:a16="http://schemas.microsoft.com/office/drawing/2014/main" id="{3006D5FF-82F9-48D2-A3C4-845A0D4632E9}"/>
+                <a16:creationId xmlns:a16="http://schemas.microsoft.com/office/drawing/2014/main" id="{240764FF-DBE6-4B73-A4B3-FE779E4156FE}"/>
               </a:ext>
             </a:extLst>
           </p:cNvPr>
@@ -3625,12 +3974,8 @@
           <a:lstStyle/>
           <a:p>
             <a:r>
-              <a:rPr lang="en-US" dirty="0" err="1"/>
-              <a:t>Konfirmasi</a:t>
-            </a:r>
-            <a:r>
-              <a:rPr lang="en-US" dirty="0"/>
-              <a:t> History</a:t>
+              <a:rPr lang="en-US" dirty="0"/>
+              <a:t>Edit User</a:t>
             </a:r>
             <a:endParaRPr lang="id-ID" dirty="0"/>
           </a:p>
@@ -3641,7 +3986,7 @@
           <p:cNvPr id="3" name="Content Placeholder 2">
             <a:extLst>
               <a:ext uri="{FF2B5EF4-FFF2-40B4-BE49-F238E27FC236}">
-                <a16:creationId xmlns:a16="http://schemas.microsoft.com/office/drawing/2014/main" id="{E2C125F8-45B1-4EAF-88C6-4720D9FCAD66}"/>
+                <a16:creationId xmlns:a16="http://schemas.microsoft.com/office/drawing/2014/main" id="{08F088E5-24E5-47EC-9D56-A46E52BD37DD}"/>
               </a:ext>
             </a:extLst>
           </p:cNvPr>
@@ -3652,31 +3997,18 @@
             <p:ph idx="1"/>
           </p:nvPr>
         </p:nvSpPr>
-        <p:spPr/>
+        <p:spPr>
+          <a:xfrm>
+            <a:off x="838201" y="1825625"/>
+            <a:ext cx="8105274" cy="4351338"/>
+          </a:xfrm>
+        </p:spPr>
         <p:txBody>
           <a:bodyPr/>
           <a:lstStyle/>
           <a:p>
             <a:r>
               <a:rPr lang="en-US" dirty="0" err="1"/>
-              <a:t>Hanya</a:t>
-            </a:r>
-            <a:r>
-              <a:rPr lang="en-US" dirty="0"/>
-              <a:t> </a:t>
-            </a:r>
-            <a:r>
-              <a:rPr lang="en-US" dirty="0" err="1"/>
-              <a:t>ada</a:t>
-            </a:r>
-            <a:r>
-              <a:rPr lang="en-US" dirty="0"/>
-              <a:t> pada admin</a:t>
-            </a:r>
-          </a:p>
-          <a:p>
-            <a:r>
-              <a:rPr lang="en-US" dirty="0" err="1"/>
               <a:t>Digunakan</a:t>
             </a:r>
             <a:r>
@@ -3693,116 +4025,68 @@
             </a:r>
             <a:r>
               <a:rPr lang="en-US" dirty="0" err="1"/>
-              <a:t>mengkonfirmasi</a:t>
-            </a:r>
-            <a:r>
-              <a:rPr lang="en-US" dirty="0"/>
-              <a:t> data </a:t>
-            </a:r>
-            <a:r>
-              <a:rPr lang="en-US" dirty="0" err="1"/>
-              <a:t>dari</a:t>
-            </a:r>
-            <a:r>
-              <a:rPr lang="en-US" dirty="0"/>
-              <a:t> history</a:t>
-            </a:r>
-          </a:p>
-          <a:p>
-            <a:r>
-              <a:rPr lang="en-US" dirty="0" err="1"/>
-              <a:t>Apabila</a:t>
-            </a:r>
-            <a:r>
-              <a:rPr lang="en-US" dirty="0"/>
-              <a:t> di </a:t>
-            </a:r>
-            <a:r>
-              <a:rPr lang="en-US" dirty="0" err="1"/>
-              <a:t>konfirmasi</a:t>
-            </a:r>
-            <a:r>
-              <a:rPr lang="en-US" dirty="0"/>
-              <a:t> </a:t>
-            </a:r>
-            <a:r>
-              <a:rPr lang="en-US" dirty="0" err="1"/>
-              <a:t>maka</a:t>
-            </a:r>
-            <a:r>
-              <a:rPr lang="en-US" dirty="0"/>
-              <a:t> </a:t>
-            </a:r>
-            <a:r>
-              <a:rPr lang="en-US" dirty="0" err="1"/>
-              <a:t>akan</a:t>
-            </a:r>
-            <a:r>
-              <a:rPr lang="en-US" dirty="0"/>
-              <a:t> </a:t>
-            </a:r>
-            <a:r>
-              <a:rPr lang="en-US" dirty="0" err="1"/>
-              <a:t>muncul</a:t>
-            </a:r>
-            <a:r>
-              <a:rPr lang="en-US" dirty="0"/>
-              <a:t> pada leaderboard</a:t>
-            </a:r>
-          </a:p>
-          <a:p>
-            <a:r>
-              <a:rPr lang="en-US" dirty="0" err="1"/>
-              <a:t>Apabila</a:t>
-            </a:r>
-            <a:r>
-              <a:rPr lang="en-US" dirty="0"/>
-              <a:t> </a:t>
-            </a:r>
-            <a:r>
-              <a:rPr lang="en-US" dirty="0" err="1"/>
-              <a:t>dihapus</a:t>
-            </a:r>
-            <a:r>
-              <a:rPr lang="en-US" dirty="0"/>
-              <a:t> </a:t>
-            </a:r>
-            <a:r>
-              <a:rPr lang="en-US" dirty="0" err="1"/>
-              <a:t>maka</a:t>
-            </a:r>
-            <a:r>
-              <a:rPr lang="en-US" dirty="0"/>
-              <a:t> </a:t>
-            </a:r>
-            <a:r>
-              <a:rPr lang="en-US" dirty="0" err="1"/>
-              <a:t>tidak</a:t>
-            </a:r>
-            <a:r>
-              <a:rPr lang="en-US" dirty="0"/>
-              <a:t> </a:t>
-            </a:r>
-            <a:r>
-              <a:rPr lang="en-US" dirty="0" err="1"/>
-              <a:t>akan</a:t>
-            </a:r>
-            <a:r>
-              <a:rPr lang="en-US" dirty="0"/>
-              <a:t> </a:t>
-            </a:r>
-            <a:r>
-              <a:rPr lang="en-US" dirty="0" err="1"/>
-              <a:t>muncul</a:t>
+              <a:t>mengubah</a:t>
+            </a:r>
+            <a:r>
+              <a:rPr lang="en-US" dirty="0"/>
+              <a:t> data user yang </a:t>
+            </a:r>
+            <a:r>
+              <a:rPr lang="en-US" dirty="0" err="1"/>
+              <a:t>sudah</a:t>
+            </a:r>
+            <a:r>
+              <a:rPr lang="en-US" dirty="0"/>
+              <a:t> </a:t>
+            </a:r>
+            <a:r>
+              <a:rPr lang="en-US" dirty="0" err="1"/>
+              <a:t>dibuat</a:t>
             </a:r>
             <a:endParaRPr lang="id-ID" dirty="0"/>
           </a:p>
         </p:txBody>
       </p:sp>
+      <p:pic>
+        <p:nvPicPr>
+          <p:cNvPr id="5" name="Picture 4">
+            <a:extLst>
+              <a:ext uri="{FF2B5EF4-FFF2-40B4-BE49-F238E27FC236}">
+                <a16:creationId xmlns:a16="http://schemas.microsoft.com/office/drawing/2014/main" id="{8490C4FA-59DA-4EAD-86A0-C463343D37B5}"/>
+              </a:ext>
+            </a:extLst>
+          </p:cNvPr>
+          <p:cNvPicPr>
+            <a:picLocks noChangeAspect="1"/>
+          </p:cNvPicPr>
+          <p:nvPr/>
+        </p:nvPicPr>
+        <p:blipFill>
+          <a:blip r:embed="rId2">
+            <a:extLst>
+              <a:ext uri="{28A0092B-C50C-407E-A947-70E740481C1C}">
+                <a14:useLocalDpi xmlns:a14="http://schemas.microsoft.com/office/drawing/2010/main" val="0"/>
+              </a:ext>
+            </a:extLst>
+          </a:blip>
+          <a:stretch>
+            <a:fillRect/>
+          </a:stretch>
+        </p:blipFill>
+        <p:spPr>
+          <a:xfrm>
+            <a:off x="8943474" y="0"/>
+            <a:ext cx="3248526" cy="6858000"/>
+          </a:xfrm>
+          <a:prstGeom prst="rect">
+            <a:avLst/>
+          </a:prstGeom>
+        </p:spPr>
+      </p:pic>
     </p:spTree>
     <p:extLst>
       <p:ext uri="{BB962C8B-B14F-4D97-AF65-F5344CB8AC3E}">
-        <p14:creationId xmlns:p14="http://schemas.microsoft.com/office/powerpoint/2010/main" val="3597967469"/>
+        <p14:creationId xmlns:p14="http://schemas.microsoft.com/office/powerpoint/2010/main" val="3953751072"/>
       </p:ext>
     </p:extLst>
   </p:cSld>
@@ -3834,7 +4118,7 @@
           <p:cNvPr id="2" name="Title 1">
             <a:extLst>
               <a:ext uri="{FF2B5EF4-FFF2-40B4-BE49-F238E27FC236}">
-                <a16:creationId xmlns:a16="http://schemas.microsoft.com/office/drawing/2014/main" id="{A270BD9A-BB84-4963-A8DE-0B38E6233AB5}"/>
+                <a16:creationId xmlns:a16="http://schemas.microsoft.com/office/drawing/2014/main" id="{3006D5FF-82F9-48D2-A3C4-845A0D4632E9}"/>
               </a:ext>
             </a:extLst>
           </p:cNvPr>
@@ -3852,11 +4136,11 @@
           <a:p>
             <a:r>
               <a:rPr lang="en-US" dirty="0" err="1"/>
-              <a:t>Tambah</a:t>
-            </a:r>
-            <a:r>
-              <a:rPr lang="en-US" dirty="0"/>
-              <a:t> Game</a:t>
+              <a:t>Konfirmasi</a:t>
+            </a:r>
+            <a:r>
+              <a:rPr lang="en-US" dirty="0"/>
+              <a:t> History</a:t>
             </a:r>
             <a:endParaRPr lang="id-ID" dirty="0"/>
           </a:p>
@@ -3867,7 +4151,7 @@
           <p:cNvPr id="3" name="Content Placeholder 2">
             <a:extLst>
               <a:ext uri="{FF2B5EF4-FFF2-40B4-BE49-F238E27FC236}">
-                <a16:creationId xmlns:a16="http://schemas.microsoft.com/office/drawing/2014/main" id="{62675503-BDFB-4511-9640-B72D49EDB7C8}"/>
+                <a16:creationId xmlns:a16="http://schemas.microsoft.com/office/drawing/2014/main" id="{E2C125F8-45B1-4EAF-88C6-4720D9FCAD66}"/>
               </a:ext>
             </a:extLst>
           </p:cNvPr>
@@ -3878,7 +4162,12 @@
             <p:ph idx="1"/>
           </p:nvPr>
         </p:nvSpPr>
-        <p:spPr/>
+        <p:spPr>
+          <a:xfrm>
+            <a:off x="838200" y="1825625"/>
+            <a:ext cx="8105274" cy="4351338"/>
+          </a:xfrm>
+        </p:spPr>
         <p:txBody>
           <a:bodyPr/>
           <a:lstStyle/>
@@ -3919,29 +4208,25 @@
             </a:r>
             <a:r>
               <a:rPr lang="en-US" dirty="0" err="1"/>
-              <a:t>menambah</a:t>
-            </a:r>
-            <a:r>
-              <a:rPr lang="en-US" dirty="0"/>
-              <a:t> game</a:t>
-            </a:r>
-          </a:p>
-          <a:p>
-            <a:r>
-              <a:rPr lang="en-US" dirty="0"/>
-              <a:t>Game yang </a:t>
-            </a:r>
-            <a:r>
-              <a:rPr lang="en-US" dirty="0" err="1"/>
-              <a:t>ditambah</a:t>
-            </a:r>
-            <a:r>
-              <a:rPr lang="en-US" dirty="0"/>
-              <a:t> </a:t>
-            </a:r>
-            <a:r>
-              <a:rPr lang="en-US" dirty="0" err="1"/>
-              <a:t>dapat</a:t>
+              <a:t>mengkonfirmasi</a:t>
+            </a:r>
+            <a:r>
+              <a:rPr lang="en-US" dirty="0"/>
+              <a:t> data </a:t>
+            </a:r>
+            <a:r>
+              <a:rPr lang="en-US" dirty="0" err="1"/>
+              <a:t>dari</a:t>
+            </a:r>
+            <a:r>
+              <a:rPr lang="en-US" dirty="0"/>
+              <a:t> history</a:t>
+            </a:r>
+          </a:p>
+          <a:p>
+            <a:r>
+              <a:rPr lang="en-US" dirty="0" err="1"/>
+              <a:t>Apabila</a:t>
             </a:r>
             <a:r>
               <a:rPr lang="en-US" dirty="0"/>
@@ -3949,40 +4234,126 @@
             </a:r>
             <a:r>
               <a:rPr lang="en-US" dirty="0" err="1"/>
-              <a:t>kategorikan</a:t>
-            </a:r>
-            <a:r>
-              <a:rPr lang="en-US" dirty="0"/>
-              <a:t> </a:t>
-            </a:r>
-            <a:r>
-              <a:rPr lang="en-US" dirty="0" err="1"/>
-              <a:t>sesuai</a:t>
-            </a:r>
-            <a:r>
-              <a:rPr lang="en-US" dirty="0"/>
-              <a:t> </a:t>
-            </a:r>
-            <a:r>
-              <a:rPr lang="en-US" dirty="0" err="1"/>
-              <a:t>kategori</a:t>
-            </a:r>
-            <a:r>
-              <a:rPr lang="en-US" dirty="0"/>
-              <a:t> yang </a:t>
-            </a:r>
-            <a:r>
-              <a:rPr lang="en-US" dirty="0" err="1"/>
-              <a:t>tersedia</a:t>
+              <a:t>konfirmasi</a:t>
+            </a:r>
+            <a:r>
+              <a:rPr lang="en-US" dirty="0"/>
+              <a:t> </a:t>
+            </a:r>
+            <a:r>
+              <a:rPr lang="en-US" dirty="0" err="1"/>
+              <a:t>maka</a:t>
+            </a:r>
+            <a:r>
+              <a:rPr lang="en-US" dirty="0"/>
+              <a:t> </a:t>
+            </a:r>
+            <a:r>
+              <a:rPr lang="en-US" dirty="0" err="1"/>
+              <a:t>akan</a:t>
+            </a:r>
+            <a:r>
+              <a:rPr lang="en-US" dirty="0"/>
+              <a:t> </a:t>
+            </a:r>
+            <a:r>
+              <a:rPr lang="en-US" dirty="0" err="1"/>
+              <a:t>muncul</a:t>
+            </a:r>
+            <a:r>
+              <a:rPr lang="en-US" dirty="0"/>
+              <a:t> pada leaderboard</a:t>
+            </a:r>
+          </a:p>
+          <a:p>
+            <a:r>
+              <a:rPr lang="en-US" dirty="0" err="1"/>
+              <a:t>Apabila</a:t>
+            </a:r>
+            <a:r>
+              <a:rPr lang="en-US" dirty="0"/>
+              <a:t> </a:t>
+            </a:r>
+            <a:r>
+              <a:rPr lang="en-US" dirty="0" err="1"/>
+              <a:t>dihapus</a:t>
+            </a:r>
+            <a:r>
+              <a:rPr lang="en-US" dirty="0"/>
+              <a:t> </a:t>
+            </a:r>
+            <a:r>
+              <a:rPr lang="en-US" dirty="0" err="1"/>
+              <a:t>maka</a:t>
+            </a:r>
+            <a:r>
+              <a:rPr lang="en-US" dirty="0"/>
+              <a:t> </a:t>
+            </a:r>
+            <a:r>
+              <a:rPr lang="en-US" dirty="0" err="1"/>
+              <a:t>tidak</a:t>
+            </a:r>
+            <a:r>
+              <a:rPr lang="en-US" dirty="0"/>
+              <a:t> </a:t>
+            </a:r>
+            <a:r>
+              <a:rPr lang="en-US" dirty="0" err="1"/>
+              <a:t>akan</a:t>
+            </a:r>
+            <a:r>
+              <a:rPr lang="en-US" dirty="0"/>
+              <a:t> </a:t>
+            </a:r>
+            <a:r>
+              <a:rPr lang="en-US" dirty="0" err="1"/>
+              <a:t>muncul</a:t>
             </a:r>
             <a:endParaRPr lang="id-ID" dirty="0"/>
           </a:p>
         </p:txBody>
       </p:sp>
+      <p:pic>
+        <p:nvPicPr>
+          <p:cNvPr id="7" name="Picture 6">
+            <a:extLst>
+              <a:ext uri="{FF2B5EF4-FFF2-40B4-BE49-F238E27FC236}">
+                <a16:creationId xmlns:a16="http://schemas.microsoft.com/office/drawing/2014/main" id="{6CAABD23-12FA-4D33-83F1-3E3ADED4E5FB}"/>
+              </a:ext>
+            </a:extLst>
+          </p:cNvPr>
+          <p:cNvPicPr>
+            <a:picLocks noChangeAspect="1"/>
+          </p:cNvPicPr>
+          <p:nvPr/>
+        </p:nvPicPr>
+        <p:blipFill>
+          <a:blip r:embed="rId2">
+            <a:extLst>
+              <a:ext uri="{28A0092B-C50C-407E-A947-70E740481C1C}">
+                <a14:useLocalDpi xmlns:a14="http://schemas.microsoft.com/office/drawing/2010/main" val="0"/>
+              </a:ext>
+            </a:extLst>
+          </a:blip>
+          <a:stretch>
+            <a:fillRect/>
+          </a:stretch>
+        </p:blipFill>
+        <p:spPr>
+          <a:xfrm>
+            <a:off x="8943474" y="-3313"/>
+            <a:ext cx="3248526" cy="6858000"/>
+          </a:xfrm>
+          <a:prstGeom prst="rect">
+            <a:avLst/>
+          </a:prstGeom>
+        </p:spPr>
+      </p:pic>
     </p:spTree>
     <p:extLst>
       <p:ext uri="{BB962C8B-B14F-4D97-AF65-F5344CB8AC3E}">
-        <p14:creationId xmlns:p14="http://schemas.microsoft.com/office/powerpoint/2010/main" val="2431328075"/>
+        <p14:creationId xmlns:p14="http://schemas.microsoft.com/office/powerpoint/2010/main" val="3597967469"/>
       </p:ext>
     </p:extLst>
   </p:cSld>
@@ -4014,7 +4385,7 @@
           <p:cNvPr id="2" name="Title 1">
             <a:extLst>
               <a:ext uri="{FF2B5EF4-FFF2-40B4-BE49-F238E27FC236}">
-                <a16:creationId xmlns:a16="http://schemas.microsoft.com/office/drawing/2014/main" id="{0985BC6D-3D71-4638-AAEA-5D7BB64165EA}"/>
+                <a16:creationId xmlns:a16="http://schemas.microsoft.com/office/drawing/2014/main" id="{A270BD9A-BB84-4963-A8DE-0B38E6233AB5}"/>
               </a:ext>
             </a:extLst>
           </p:cNvPr>
@@ -4031,8 +4402,12 @@
           <a:lstStyle/>
           <a:p>
             <a:r>
-              <a:rPr lang="en-US" dirty="0"/>
-              <a:t>Daftar User</a:t>
+              <a:rPr lang="en-US" dirty="0" err="1"/>
+              <a:t>Tambah</a:t>
+            </a:r>
+            <a:r>
+              <a:rPr lang="en-US" dirty="0"/>
+              <a:t> Game</a:t>
             </a:r>
             <a:endParaRPr lang="id-ID" dirty="0"/>
           </a:p>
@@ -4043,7 +4418,7 @@
           <p:cNvPr id="3" name="Content Placeholder 2">
             <a:extLst>
               <a:ext uri="{FF2B5EF4-FFF2-40B4-BE49-F238E27FC236}">
-                <a16:creationId xmlns:a16="http://schemas.microsoft.com/office/drawing/2014/main" id="{57ABA393-1B6C-4FC0-BECB-18CA804333E0}"/>
+                <a16:creationId xmlns:a16="http://schemas.microsoft.com/office/drawing/2014/main" id="{62675503-BDFB-4511-9640-B72D49EDB7C8}"/>
               </a:ext>
             </a:extLst>
           </p:cNvPr>
@@ -4054,7 +4429,12 @@
             <p:ph idx="1"/>
           </p:nvPr>
         </p:nvSpPr>
-        <p:spPr/>
+        <p:spPr>
+          <a:xfrm>
+            <a:off x="838200" y="1825625"/>
+            <a:ext cx="8081828" cy="4351338"/>
+          </a:xfrm>
+        </p:spPr>
         <p:txBody>
           <a:bodyPr/>
           <a:lstStyle/>
@@ -4095,6 +4475,252 @@
             </a:r>
             <a:r>
               <a:rPr lang="en-US" dirty="0" err="1"/>
+              <a:t>menambah</a:t>
+            </a:r>
+            <a:r>
+              <a:rPr lang="en-US" dirty="0"/>
+              <a:t> game</a:t>
+            </a:r>
+          </a:p>
+          <a:p>
+            <a:r>
+              <a:rPr lang="en-US" dirty="0"/>
+              <a:t>Game yang </a:t>
+            </a:r>
+            <a:r>
+              <a:rPr lang="en-US" dirty="0" err="1"/>
+              <a:t>ditambah</a:t>
+            </a:r>
+            <a:r>
+              <a:rPr lang="en-US" dirty="0"/>
+              <a:t> </a:t>
+            </a:r>
+            <a:r>
+              <a:rPr lang="en-US" dirty="0" err="1"/>
+              <a:t>dapat</a:t>
+            </a:r>
+            <a:r>
+              <a:rPr lang="en-US" dirty="0"/>
+              <a:t> di </a:t>
+            </a:r>
+            <a:r>
+              <a:rPr lang="en-US" dirty="0" err="1"/>
+              <a:t>kategorikan</a:t>
+            </a:r>
+            <a:r>
+              <a:rPr lang="en-US" dirty="0"/>
+              <a:t> </a:t>
+            </a:r>
+            <a:r>
+              <a:rPr lang="en-US" dirty="0" err="1"/>
+              <a:t>sesuai</a:t>
+            </a:r>
+            <a:r>
+              <a:rPr lang="en-US" dirty="0"/>
+              <a:t> </a:t>
+            </a:r>
+            <a:r>
+              <a:rPr lang="en-US" dirty="0" err="1"/>
+              <a:t>kategori</a:t>
+            </a:r>
+            <a:r>
+              <a:rPr lang="en-US" dirty="0"/>
+              <a:t> yang </a:t>
+            </a:r>
+            <a:r>
+              <a:rPr lang="en-US" dirty="0" err="1"/>
+              <a:t>tersedia</a:t>
+            </a:r>
+            <a:endParaRPr lang="id-ID" dirty="0"/>
+          </a:p>
+        </p:txBody>
+      </p:sp>
+      <p:pic>
+        <p:nvPicPr>
+          <p:cNvPr id="7" name="Picture 6">
+            <a:extLst>
+              <a:ext uri="{FF2B5EF4-FFF2-40B4-BE49-F238E27FC236}">
+                <a16:creationId xmlns:a16="http://schemas.microsoft.com/office/drawing/2014/main" id="{4734C267-7682-483E-B72D-1A27FE58EDDB}"/>
+              </a:ext>
+            </a:extLst>
+          </p:cNvPr>
+          <p:cNvPicPr>
+            <a:picLocks noChangeAspect="1"/>
+          </p:cNvPicPr>
+          <p:nvPr/>
+        </p:nvPicPr>
+        <p:blipFill rotWithShape="1">
+          <a:blip r:embed="rId2">
+            <a:extLst>
+              <a:ext uri="{28A0092B-C50C-407E-A947-70E740481C1C}">
+                <a14:useLocalDpi xmlns:a14="http://schemas.microsoft.com/office/drawing/2010/main" val="0"/>
+              </a:ext>
+            </a:extLst>
+          </a:blip>
+          <a:srcRect t="65665" b="-302"/>
+          <a:stretch/>
+        </p:blipFill>
+        <p:spPr>
+          <a:xfrm>
+            <a:off x="8920028" y="4712677"/>
+            <a:ext cx="3271972" cy="2145323"/>
+          </a:xfrm>
+          <a:prstGeom prst="rect">
+            <a:avLst/>
+          </a:prstGeom>
+        </p:spPr>
+      </p:pic>
+      <p:pic>
+        <p:nvPicPr>
+          <p:cNvPr id="9" name="Picture 8">
+            <a:extLst>
+              <a:ext uri="{FF2B5EF4-FFF2-40B4-BE49-F238E27FC236}">
+                <a16:creationId xmlns:a16="http://schemas.microsoft.com/office/drawing/2014/main" id="{B3DAC26B-38E0-46DD-AB58-BCAAD0058FE3}"/>
+              </a:ext>
+            </a:extLst>
+          </p:cNvPr>
+          <p:cNvPicPr>
+            <a:picLocks noChangeAspect="1"/>
+          </p:cNvPicPr>
+          <p:nvPr/>
+        </p:nvPicPr>
+        <p:blipFill rotWithShape="1">
+          <a:blip r:embed="rId3">
+            <a:extLst>
+              <a:ext uri="{28A0092B-C50C-407E-A947-70E740481C1C}">
+                <a14:useLocalDpi xmlns:a14="http://schemas.microsoft.com/office/drawing/2010/main" val="0"/>
+              </a:ext>
+            </a:extLst>
+          </a:blip>
+          <a:srcRect t="13" b="12979"/>
+          <a:stretch/>
+        </p:blipFill>
+        <p:spPr>
+          <a:xfrm>
+            <a:off x="8943474" y="0"/>
+            <a:ext cx="3248526" cy="4824000"/>
+          </a:xfrm>
+          <a:prstGeom prst="rect">
+            <a:avLst/>
+          </a:prstGeom>
+        </p:spPr>
+      </p:pic>
+    </p:spTree>
+    <p:extLst>
+      <p:ext uri="{BB962C8B-B14F-4D97-AF65-F5344CB8AC3E}">
+        <p14:creationId xmlns:p14="http://schemas.microsoft.com/office/powerpoint/2010/main" val="2431328075"/>
+      </p:ext>
+    </p:extLst>
+  </p:cSld>
+  <p:clrMapOvr>
+    <a:masterClrMapping/>
+  </p:clrMapOvr>
+</p:sld>
+</file>
+
+<file path=ppt/slides/slide14.xml><?xml version="1.0" encoding="utf-8"?>
+<p:sld xmlns:a="http://schemas.openxmlformats.org/drawingml/2006/main" xmlns:r="http://schemas.openxmlformats.org/officeDocument/2006/relationships" xmlns:p="http://schemas.openxmlformats.org/presentationml/2006/main">
+  <p:cSld>
+    <p:spTree>
+      <p:nvGrpSpPr>
+        <p:cNvPr id="1" name=""/>
+        <p:cNvGrpSpPr/>
+        <p:nvPr/>
+      </p:nvGrpSpPr>
+      <p:grpSpPr>
+        <a:xfrm>
+          <a:off x="0" y="0"/>
+          <a:ext cx="0" cy="0"/>
+          <a:chOff x="0" y="0"/>
+          <a:chExt cx="0" cy="0"/>
+        </a:xfrm>
+      </p:grpSpPr>
+      <p:sp>
+        <p:nvSpPr>
+          <p:cNvPr id="2" name="Title 1">
+            <a:extLst>
+              <a:ext uri="{FF2B5EF4-FFF2-40B4-BE49-F238E27FC236}">
+                <a16:creationId xmlns:a16="http://schemas.microsoft.com/office/drawing/2014/main" id="{0985BC6D-3D71-4638-AAEA-5D7BB64165EA}"/>
+              </a:ext>
+            </a:extLst>
+          </p:cNvPr>
+          <p:cNvSpPr>
+            <a:spLocks noGrp="1"/>
+          </p:cNvSpPr>
+          <p:nvPr>
+            <p:ph type="title"/>
+          </p:nvPr>
+        </p:nvSpPr>
+        <p:spPr/>
+        <p:txBody>
+          <a:bodyPr/>
+          <a:lstStyle/>
+          <a:p>
+            <a:r>
+              <a:rPr lang="en-US" dirty="0"/>
+              <a:t>Daftar User</a:t>
+            </a:r>
+            <a:endParaRPr lang="id-ID" dirty="0"/>
+          </a:p>
+        </p:txBody>
+      </p:sp>
+      <p:sp>
+        <p:nvSpPr>
+          <p:cNvPr id="3" name="Content Placeholder 2">
+            <a:extLst>
+              <a:ext uri="{FF2B5EF4-FFF2-40B4-BE49-F238E27FC236}">
+                <a16:creationId xmlns:a16="http://schemas.microsoft.com/office/drawing/2014/main" id="{57ABA393-1B6C-4FC0-BECB-18CA804333E0}"/>
+              </a:ext>
+            </a:extLst>
+          </p:cNvPr>
+          <p:cNvSpPr>
+            <a:spLocks noGrp="1"/>
+          </p:cNvSpPr>
+          <p:nvPr>
+            <p:ph idx="1"/>
+          </p:nvPr>
+        </p:nvSpPr>
+        <p:spPr/>
+        <p:txBody>
+          <a:bodyPr/>
+          <a:lstStyle/>
+          <a:p>
+            <a:r>
+              <a:rPr lang="en-US" dirty="0" err="1"/>
+              <a:t>Hanya</a:t>
+            </a:r>
+            <a:r>
+              <a:rPr lang="en-US" dirty="0"/>
+              <a:t> </a:t>
+            </a:r>
+            <a:r>
+              <a:rPr lang="en-US" dirty="0" err="1"/>
+              <a:t>ada</a:t>
+            </a:r>
+            <a:r>
+              <a:rPr lang="en-US" dirty="0"/>
+              <a:t> pada admin</a:t>
+            </a:r>
+          </a:p>
+          <a:p>
+            <a:r>
+              <a:rPr lang="en-US" dirty="0" err="1"/>
+              <a:t>Digunakan</a:t>
+            </a:r>
+            <a:r>
+              <a:rPr lang="en-US" dirty="0"/>
+              <a:t> </a:t>
+            </a:r>
+            <a:r>
+              <a:rPr lang="en-US" dirty="0" err="1"/>
+              <a:t>untuk</a:t>
+            </a:r>
+            <a:r>
+              <a:rPr lang="en-US" dirty="0"/>
+              <a:t> </a:t>
+            </a:r>
+            <a:r>
+              <a:rPr lang="en-US" dirty="0" err="1"/>
               <a:t>melihat</a:t>
             </a:r>
             <a:r>
@@ -4165,6 +4791,76 @@
           </a:p>
         </p:txBody>
       </p:sp>
+      <p:pic>
+        <p:nvPicPr>
+          <p:cNvPr id="7" name="Picture 6">
+            <a:extLst>
+              <a:ext uri="{FF2B5EF4-FFF2-40B4-BE49-F238E27FC236}">
+                <a16:creationId xmlns:a16="http://schemas.microsoft.com/office/drawing/2014/main" id="{C1789E42-E495-4D36-B97E-AA1A9037FA46}"/>
+              </a:ext>
+            </a:extLst>
+          </p:cNvPr>
+          <p:cNvPicPr>
+            <a:picLocks noChangeAspect="1"/>
+          </p:cNvPicPr>
+          <p:nvPr/>
+        </p:nvPicPr>
+        <p:blipFill rotWithShape="1">
+          <a:blip r:embed="rId2">
+            <a:extLst>
+              <a:ext uri="{28A0092B-C50C-407E-A947-70E740481C1C}">
+                <a14:useLocalDpi xmlns:a14="http://schemas.microsoft.com/office/drawing/2010/main" val="0"/>
+              </a:ext>
+            </a:extLst>
+          </a:blip>
+          <a:srcRect t="78245" b="-292"/>
+          <a:stretch/>
+        </p:blipFill>
+        <p:spPr>
+          <a:xfrm>
+            <a:off x="8943474" y="5346000"/>
+            <a:ext cx="3248526" cy="1512000"/>
+          </a:xfrm>
+          <a:prstGeom prst="rect">
+            <a:avLst/>
+          </a:prstGeom>
+        </p:spPr>
+      </p:pic>
+      <p:pic>
+        <p:nvPicPr>
+          <p:cNvPr id="9" name="Picture 8">
+            <a:extLst>
+              <a:ext uri="{FF2B5EF4-FFF2-40B4-BE49-F238E27FC236}">
+                <a16:creationId xmlns:a16="http://schemas.microsoft.com/office/drawing/2014/main" id="{30D737B5-3703-4C9F-A2CF-65FD528DA133}"/>
+              </a:ext>
+            </a:extLst>
+          </p:cNvPr>
+          <p:cNvPicPr>
+            <a:picLocks noChangeAspect="1"/>
+          </p:cNvPicPr>
+          <p:nvPr/>
+        </p:nvPicPr>
+        <p:blipFill rotWithShape="1">
+          <a:blip r:embed="rId3">
+            <a:extLst>
+              <a:ext uri="{28A0092B-C50C-407E-A947-70E740481C1C}">
+                <a14:useLocalDpi xmlns:a14="http://schemas.microsoft.com/office/drawing/2010/main" val="0"/>
+              </a:ext>
+            </a:extLst>
+          </a:blip>
+          <a:srcRect t="3" b="23885"/>
+          <a:stretch/>
+        </p:blipFill>
+        <p:spPr>
+          <a:xfrm>
+            <a:off x="8943474" y="0"/>
+            <a:ext cx="3248526" cy="5220000"/>
+          </a:xfrm>
+          <a:prstGeom prst="rect">
+            <a:avLst/>
+          </a:prstGeom>
+        </p:spPr>
+      </p:pic>
     </p:spTree>
     <p:extLst>
       <p:ext uri="{BB962C8B-B14F-4D97-AF65-F5344CB8AC3E}">
@@ -4213,14 +4909,15 @@
         </p:nvSpPr>
         <p:spPr>
           <a:xfrm>
-            <a:off x="1640156" y="544735"/>
-            <a:ext cx="8911687" cy="1280890"/>
+            <a:off x="838200" y="544735"/>
+            <a:ext cx="2216226" cy="1280890"/>
           </a:xfrm>
         </p:spPr>
         <p:txBody>
           <a:bodyPr/>
           <a:lstStyle/>
           <a:p>
+            <a:pPr algn="just"/>
             <a:r>
               <a:rPr lang="en-US" dirty="0" err="1"/>
               <a:t>Anggota</a:t>
@@ -4841,7 +5538,7 @@
           <p:cNvPr id="2" name="Title 1">
             <a:extLst>
               <a:ext uri="{FF2B5EF4-FFF2-40B4-BE49-F238E27FC236}">
-                <a16:creationId xmlns:a16="http://schemas.microsoft.com/office/drawing/2014/main" id="{0C97E3E9-8B20-4B0A-8B03-9166D10428D4}"/>
+                <a16:creationId xmlns:a16="http://schemas.microsoft.com/office/drawing/2014/main" id="{DD7D05CC-4FA7-4B8F-8743-908A14122A6A}"/>
               </a:ext>
             </a:extLst>
           </p:cNvPr>
@@ -4858,10 +5555,10 @@
           <a:lstStyle/>
           <a:p>
             <a:r>
-              <a:rPr lang="en-US" dirty="0"/>
-              <a:t>Login</a:t>
-            </a:r>
-            <a:endParaRPr lang="id-ID" dirty="0"/>
+              <a:rPr lang="id-ID" dirty="0"/>
+              <a:t>Aplikasi</a:t>
+            </a:r>
+            <a:endParaRPr lang="en-ID" dirty="0"/>
           </a:p>
         </p:txBody>
       </p:sp>
@@ -4870,7 +5567,7 @@
           <p:cNvPr id="3" name="Content Placeholder 2">
             <a:extLst>
               <a:ext uri="{FF2B5EF4-FFF2-40B4-BE49-F238E27FC236}">
-                <a16:creationId xmlns:a16="http://schemas.microsoft.com/office/drawing/2014/main" id="{4307ABFB-6256-45D2-9835-E84B9D55D92F}"/>
+                <a16:creationId xmlns:a16="http://schemas.microsoft.com/office/drawing/2014/main" id="{57CF2088-B889-401B-A34E-C751DDF0E19A}"/>
               </a:ext>
             </a:extLst>
           </p:cNvPr>
@@ -4887,148 +5584,35 @@
           <a:lstStyle/>
           <a:p>
             <a:r>
-              <a:rPr lang="en-US" dirty="0" err="1"/>
-              <a:t>Digunakan</a:t>
-            </a:r>
-            <a:r>
-              <a:rPr lang="en-US" dirty="0"/>
-              <a:t> </a:t>
-            </a:r>
-            <a:r>
-              <a:rPr lang="en-US" dirty="0" err="1"/>
-              <a:t>untuk</a:t>
-            </a:r>
-            <a:r>
-              <a:rPr lang="en-US" dirty="0"/>
-              <a:t> </a:t>
-            </a:r>
-            <a:r>
-              <a:rPr lang="en-US" dirty="0" err="1"/>
-              <a:t>masuk</a:t>
-            </a:r>
-            <a:r>
-              <a:rPr lang="en-US" dirty="0"/>
-              <a:t> dan </a:t>
-            </a:r>
-            <a:r>
-              <a:rPr lang="en-US" dirty="0" err="1"/>
-              <a:t>menggunakan</a:t>
-            </a:r>
-            <a:r>
-              <a:rPr lang="en-US" dirty="0"/>
-              <a:t> </a:t>
-            </a:r>
-            <a:r>
-              <a:rPr lang="en-US" dirty="0" err="1"/>
-              <a:t>fitur</a:t>
-            </a:r>
-            <a:r>
-              <a:rPr lang="en-US" dirty="0"/>
-              <a:t> </a:t>
-            </a:r>
-            <a:r>
-              <a:rPr lang="en-US" dirty="0" err="1"/>
-              <a:t>aplikasi</a:t>
-            </a:r>
-            <a:endParaRPr lang="en-US" dirty="0"/>
-          </a:p>
-          <a:p>
-            <a:r>
-              <a:rPr lang="en-US" dirty="0"/>
-              <a:t>Login </a:t>
-            </a:r>
-            <a:r>
-              <a:rPr lang="en-US" dirty="0" err="1"/>
-              <a:t>menggunakan</a:t>
-            </a:r>
-            <a:r>
-              <a:rPr lang="en-US" dirty="0"/>
-              <a:t> email dan kata </a:t>
-            </a:r>
-            <a:r>
-              <a:rPr lang="en-US" dirty="0" err="1"/>
-              <a:t>sandi</a:t>
-            </a:r>
-            <a:endParaRPr lang="en-US" dirty="0"/>
-          </a:p>
-          <a:p>
-            <a:r>
-              <a:rPr lang="en-US" dirty="0"/>
-              <a:t>Kata </a:t>
-            </a:r>
-            <a:r>
-              <a:rPr lang="en-US" dirty="0" err="1"/>
-              <a:t>sandi</a:t>
-            </a:r>
-            <a:r>
-              <a:rPr lang="en-US" dirty="0"/>
-              <a:t> </a:t>
-            </a:r>
-            <a:r>
-              <a:rPr lang="en-US" dirty="0" err="1"/>
-              <a:t>dapat</a:t>
-            </a:r>
-            <a:r>
-              <a:rPr lang="en-US" dirty="0"/>
-              <a:t> di hide dan unhide</a:t>
-            </a:r>
-          </a:p>
-          <a:p>
-            <a:r>
-              <a:rPr lang="en-US" dirty="0" err="1"/>
-              <a:t>Apabila</a:t>
-            </a:r>
-            <a:r>
-              <a:rPr lang="en-US" dirty="0"/>
-              <a:t> data </a:t>
-            </a:r>
-            <a:r>
-              <a:rPr lang="en-US" dirty="0" err="1"/>
-              <a:t>kosong</a:t>
-            </a:r>
-            <a:r>
-              <a:rPr lang="en-US" dirty="0"/>
-              <a:t> </a:t>
-            </a:r>
-            <a:r>
-              <a:rPr lang="en-US" dirty="0" err="1"/>
-              <a:t>maka</a:t>
-            </a:r>
-            <a:r>
-              <a:rPr lang="en-US" dirty="0"/>
-              <a:t> </a:t>
-            </a:r>
-            <a:r>
-              <a:rPr lang="en-US" dirty="0" err="1"/>
-              <a:t>akan</a:t>
-            </a:r>
-            <a:r>
-              <a:rPr lang="en-US" dirty="0"/>
-              <a:t> </a:t>
-            </a:r>
-            <a:r>
-              <a:rPr lang="en-US" dirty="0" err="1"/>
-              <a:t>ada</a:t>
-            </a:r>
-            <a:r>
-              <a:rPr lang="en-US" dirty="0"/>
-              <a:t> </a:t>
-            </a:r>
-            <a:r>
-              <a:rPr lang="en-US" dirty="0" err="1"/>
-              <a:t>pemberitahuan</a:t>
-            </a:r>
-            <a:endParaRPr lang="id-ID" dirty="0"/>
-          </a:p>
-          <a:p>
-            <a:endParaRPr lang="en-US" dirty="0"/>
+              <a:rPr lang="id-ID" dirty="0"/>
+              <a:t>Sebagai tempat untuk mempertunjukkan poin pemain game papan (Board Game) dan memberikan peringkat pemain dari poin pemain tertinggi hingga terendah.</a:t>
+            </a:r>
+          </a:p>
+          <a:p>
+            <a:r>
+              <a:rPr lang="id-ID" dirty="0"/>
+              <a:t>Aplikasi dibagi menjadi 2 bagian: Admin dan Client.</a:t>
+            </a:r>
+          </a:p>
+          <a:p>
+            <a:r>
+              <a:rPr lang="id-ID" dirty="0"/>
+              <a:t>Admin: bertugas memeriksa poin yang dimasukkan pemain dan memasukkanya ke leaderboard.</a:t>
+            </a:r>
+          </a:p>
+          <a:p>
+            <a:r>
+              <a:rPr lang="id-ID" dirty="0"/>
+              <a:t>Client: dapat memasukkan poin ke leaderboard, dan dapat melihat poin pemain lainnya.</a:t>
+            </a:r>
+            <a:endParaRPr lang="en-ID" dirty="0"/>
           </a:p>
         </p:txBody>
       </p:sp>
     </p:spTree>
     <p:extLst>
       <p:ext uri="{BB962C8B-B14F-4D97-AF65-F5344CB8AC3E}">
-        <p14:creationId xmlns:p14="http://schemas.microsoft.com/office/powerpoint/2010/main" val="3679798174"/>
+        <p14:creationId xmlns:p14="http://schemas.microsoft.com/office/powerpoint/2010/main" val="2531540439"/>
       </p:ext>
     </p:extLst>
   </p:cSld>
@@ -5060,7 +5644,7 @@
           <p:cNvPr id="2" name="Title 1">
             <a:extLst>
               <a:ext uri="{FF2B5EF4-FFF2-40B4-BE49-F238E27FC236}">
-                <a16:creationId xmlns:a16="http://schemas.microsoft.com/office/drawing/2014/main" id="{0BC18AD4-F329-4626-848F-3F6F7217AE16}"/>
+                <a16:creationId xmlns:a16="http://schemas.microsoft.com/office/drawing/2014/main" id="{0C97E3E9-8B20-4B0A-8B03-9166D10428D4}"/>
               </a:ext>
             </a:extLst>
           </p:cNvPr>
@@ -5078,7 +5662,7 @@
           <a:p>
             <a:r>
               <a:rPr lang="en-US" dirty="0"/>
-              <a:t>Sign Up</a:t>
+              <a:t>Login</a:t>
             </a:r>
             <a:endParaRPr lang="id-ID" dirty="0"/>
           </a:p>
@@ -5089,7 +5673,7 @@
           <p:cNvPr id="3" name="Content Placeholder 2">
             <a:extLst>
               <a:ext uri="{FF2B5EF4-FFF2-40B4-BE49-F238E27FC236}">
-                <a16:creationId xmlns:a16="http://schemas.microsoft.com/office/drawing/2014/main" id="{9C867D68-63AC-4E2E-8D8C-2E152857E7B6}"/>
+                <a16:creationId xmlns:a16="http://schemas.microsoft.com/office/drawing/2014/main" id="{4307ABFB-6256-45D2-9835-E84B9D55D92F}"/>
               </a:ext>
             </a:extLst>
           </p:cNvPr>
@@ -5100,7 +5684,12 @@
             <p:ph idx="1"/>
           </p:nvPr>
         </p:nvSpPr>
-        <p:spPr/>
+        <p:spPr>
+          <a:xfrm>
+            <a:off x="838200" y="1825625"/>
+            <a:ext cx="8105274" cy="4351338"/>
+          </a:xfrm>
+        </p:spPr>
         <p:txBody>
           <a:bodyPr/>
           <a:lstStyle/>
@@ -5123,15 +5712,23 @@
             </a:r>
             <a:r>
               <a:rPr lang="en-US" dirty="0" err="1"/>
-              <a:t>mendaftar</a:t>
-            </a:r>
-            <a:r>
-              <a:rPr lang="en-US" dirty="0"/>
-              <a:t> </a:t>
-            </a:r>
-            <a:r>
-              <a:rPr lang="en-US" dirty="0" err="1"/>
-              <a:t>ke</a:t>
+              <a:t>masuk</a:t>
+            </a:r>
+            <a:r>
+              <a:rPr lang="en-US" dirty="0"/>
+              <a:t> dan </a:t>
+            </a:r>
+            <a:r>
+              <a:rPr lang="en-US" dirty="0" err="1"/>
+              <a:t>menggunakan</a:t>
+            </a:r>
+            <a:r>
+              <a:rPr lang="en-US" dirty="0"/>
+              <a:t> </a:t>
+            </a:r>
+            <a:r>
+              <a:rPr lang="en-US" dirty="0" err="1"/>
+              <a:t>fitur</a:t>
             </a:r>
             <a:r>
               <a:rPr lang="en-US" dirty="0"/>
@@ -5146,39 +5743,76 @@
           <a:p>
             <a:r>
               <a:rPr lang="en-US" dirty="0"/>
-              <a:t>Data </a:t>
-            </a:r>
-            <a:r>
-              <a:rPr lang="en-US" dirty="0" err="1"/>
-              <a:t>harus</a:t>
-            </a:r>
-            <a:r>
-              <a:rPr lang="en-US" dirty="0"/>
-              <a:t> </a:t>
-            </a:r>
-            <a:r>
-              <a:rPr lang="en-US" dirty="0" err="1"/>
-              <a:t>dimasukkan</a:t>
-            </a:r>
-            <a:r>
-              <a:rPr lang="en-US" dirty="0"/>
-              <a:t> </a:t>
-            </a:r>
-            <a:r>
-              <a:rPr lang="en-US" dirty="0" err="1"/>
-              <a:t>sesuai</a:t>
-            </a:r>
-            <a:r>
-              <a:rPr lang="en-US" dirty="0"/>
-              <a:t> </a:t>
-            </a:r>
-            <a:r>
-              <a:rPr lang="en-US" dirty="0" err="1"/>
-              <a:t>apa</a:t>
-            </a:r>
-            <a:r>
-              <a:rPr lang="en-US" dirty="0"/>
-              <a:t> yang </a:t>
+              <a:t>Login </a:t>
+            </a:r>
+            <a:r>
+              <a:rPr lang="en-US" dirty="0" err="1"/>
+              <a:t>menggunakan</a:t>
+            </a:r>
+            <a:r>
+              <a:rPr lang="en-US" dirty="0"/>
+              <a:t> email dan kata </a:t>
+            </a:r>
+            <a:r>
+              <a:rPr lang="en-US" dirty="0" err="1"/>
+              <a:t>sandi</a:t>
+            </a:r>
+            <a:endParaRPr lang="en-US" dirty="0"/>
+          </a:p>
+          <a:p>
+            <a:r>
+              <a:rPr lang="en-US" dirty="0"/>
+              <a:t>Kata </a:t>
+            </a:r>
+            <a:r>
+              <a:rPr lang="en-US" dirty="0" err="1"/>
+              <a:t>sandi</a:t>
+            </a:r>
+            <a:r>
+              <a:rPr lang="en-US" dirty="0"/>
+              <a:t> </a:t>
+            </a:r>
+            <a:r>
+              <a:rPr lang="en-US" dirty="0" err="1"/>
+              <a:t>dapat</a:t>
+            </a:r>
+            <a:r>
+              <a:rPr lang="en-US" dirty="0"/>
+              <a:t> di hide dan unhide</a:t>
+            </a:r>
+          </a:p>
+          <a:p>
+            <a:r>
+              <a:rPr lang="en-US" dirty="0" err="1"/>
+              <a:t>Apabila</a:t>
+            </a:r>
+            <a:r>
+              <a:rPr lang="en-US" dirty="0"/>
+              <a:t> data </a:t>
+            </a:r>
+            <a:r>
+              <a:rPr lang="en-US" dirty="0" err="1"/>
+              <a:t>kosong</a:t>
+            </a:r>
+            <a:r>
+              <a:rPr lang="en-US" dirty="0"/>
+              <a:t> </a:t>
+            </a:r>
+            <a:r>
+              <a:rPr lang="en-US" dirty="0" err="1"/>
+              <a:t>maka</a:t>
+            </a:r>
+            <a:r>
+              <a:rPr lang="en-US" dirty="0"/>
+              <a:t> </a:t>
+            </a:r>
+            <a:r>
+              <a:rPr lang="en-US" dirty="0" err="1"/>
+              <a:t>akan</a:t>
+            </a:r>
+            <a:r>
+              <a:rPr lang="en-US" dirty="0"/>
+              <a:t> </a:t>
             </a:r>
             <a:r>
               <a:rPr lang="en-US" dirty="0" err="1"/>
@@ -5186,67 +5820,59 @@
             </a:r>
             <a:r>
               <a:rPr lang="en-US" dirty="0"/>
-              <a:t> pada </a:t>
-            </a:r>
-            <a:r>
-              <a:rPr lang="en-US" dirty="0" err="1"/>
-              <a:t>aplikasi</a:t>
-            </a:r>
+              <a:t> </a:t>
+            </a:r>
+            <a:r>
+              <a:rPr lang="en-US" dirty="0" err="1"/>
+              <a:t>pemberitahuan</a:t>
+            </a:r>
+            <a:endParaRPr lang="id-ID" dirty="0"/>
+          </a:p>
+          <a:p>
             <a:endParaRPr lang="en-US" dirty="0"/>
           </a:p>
-          <a:p>
-            <a:r>
-              <a:rPr lang="en-US" dirty="0" err="1"/>
-              <a:t>Apabila</a:t>
-            </a:r>
-            <a:r>
-              <a:rPr lang="en-US" dirty="0"/>
-              <a:t> data </a:t>
-            </a:r>
-            <a:r>
-              <a:rPr lang="en-US" dirty="0" err="1"/>
-              <a:t>kosong</a:t>
-            </a:r>
-            <a:r>
-              <a:rPr lang="en-US" dirty="0"/>
-              <a:t> </a:t>
-            </a:r>
-            <a:r>
-              <a:rPr lang="en-US" dirty="0" err="1"/>
-              <a:t>maka</a:t>
-            </a:r>
-            <a:r>
-              <a:rPr lang="en-US" dirty="0"/>
-              <a:t> </a:t>
-            </a:r>
-            <a:r>
-              <a:rPr lang="en-US" dirty="0" err="1"/>
-              <a:t>akan</a:t>
-            </a:r>
-            <a:r>
-              <a:rPr lang="en-US" dirty="0"/>
-              <a:t> </a:t>
-            </a:r>
-            <a:r>
-              <a:rPr lang="en-US" dirty="0" err="1"/>
-              <a:t>ada</a:t>
-            </a:r>
-            <a:r>
-              <a:rPr lang="en-US" dirty="0"/>
-              <a:t> </a:t>
-            </a:r>
-            <a:r>
-              <a:rPr lang="en-US" dirty="0" err="1"/>
-              <a:t>pemberitahuan</a:t>
-            </a:r>
-            <a:endParaRPr lang="id-ID" dirty="0"/>
-          </a:p>
-        </p:txBody>
-      </p:sp>
+        </p:txBody>
+      </p:sp>
+      <p:pic>
+        <p:nvPicPr>
+          <p:cNvPr id="5" name="Picture 4">
+            <a:extLst>
+              <a:ext uri="{FF2B5EF4-FFF2-40B4-BE49-F238E27FC236}">
+                <a16:creationId xmlns:a16="http://schemas.microsoft.com/office/drawing/2014/main" id="{A38804AF-A12D-4458-A29B-88D025EDADA6}"/>
+              </a:ext>
+            </a:extLst>
+          </p:cNvPr>
+          <p:cNvPicPr>
+            <a:picLocks noChangeAspect="1"/>
+          </p:cNvPicPr>
+          <p:nvPr/>
+        </p:nvPicPr>
+        <p:blipFill>
+          <a:blip r:embed="rId2">
+            <a:extLst>
+              <a:ext uri="{28A0092B-C50C-407E-A947-70E740481C1C}">
+                <a14:useLocalDpi xmlns:a14="http://schemas.microsoft.com/office/drawing/2010/main" val="0"/>
+              </a:ext>
+            </a:extLst>
+          </a:blip>
+          <a:stretch>
+            <a:fillRect/>
+          </a:stretch>
+        </p:blipFill>
+        <p:spPr>
+          <a:xfrm>
+            <a:off x="8943474" y="0"/>
+            <a:ext cx="3248526" cy="6858000"/>
+          </a:xfrm>
+          <a:prstGeom prst="rect">
+            <a:avLst/>
+          </a:prstGeom>
+        </p:spPr>
+      </p:pic>
     </p:spTree>
     <p:extLst>
       <p:ext uri="{BB962C8B-B14F-4D97-AF65-F5344CB8AC3E}">
-        <p14:creationId xmlns:p14="http://schemas.microsoft.com/office/powerpoint/2010/main" val="413477081"/>
+        <p14:creationId xmlns:p14="http://schemas.microsoft.com/office/powerpoint/2010/main" val="3679798174"/>
       </p:ext>
     </p:extLst>
   </p:cSld>
@@ -5278,7 +5904,7 @@
           <p:cNvPr id="2" name="Title 1">
             <a:extLst>
               <a:ext uri="{FF2B5EF4-FFF2-40B4-BE49-F238E27FC236}">
-                <a16:creationId xmlns:a16="http://schemas.microsoft.com/office/drawing/2014/main" id="{73C02C38-7036-478B-A545-FA4F7D21D312}"/>
+                <a16:creationId xmlns:a16="http://schemas.microsoft.com/office/drawing/2014/main" id="{0BC18AD4-F329-4626-848F-3F6F7217AE16}"/>
               </a:ext>
             </a:extLst>
           </p:cNvPr>
@@ -5296,7 +5922,7 @@
           <a:p>
             <a:r>
               <a:rPr lang="en-US" dirty="0"/>
-              <a:t>Login dan Dashboard</a:t>
+              <a:t>Sign Up</a:t>
             </a:r>
             <a:endParaRPr lang="id-ID" dirty="0"/>
           </a:p>
@@ -5307,7 +5933,7 @@
           <p:cNvPr id="3" name="Content Placeholder 2">
             <a:extLst>
               <a:ext uri="{FF2B5EF4-FFF2-40B4-BE49-F238E27FC236}">
-                <a16:creationId xmlns:a16="http://schemas.microsoft.com/office/drawing/2014/main" id="{DCAF3080-916C-4FB7-ACC5-3FB855708FA0}"/>
+                <a16:creationId xmlns:a16="http://schemas.microsoft.com/office/drawing/2014/main" id="{9C867D68-63AC-4E2E-8D8C-2E152857E7B6}"/>
               </a:ext>
             </a:extLst>
           </p:cNvPr>
@@ -5318,49 +5944,121 @@
             <p:ph idx="1"/>
           </p:nvPr>
         </p:nvSpPr>
-        <p:spPr/>
+        <p:spPr>
+          <a:xfrm>
+            <a:off x="838200" y="1825625"/>
+            <a:ext cx="8105274" cy="4351338"/>
+          </a:xfrm>
+        </p:spPr>
         <p:txBody>
           <a:bodyPr/>
           <a:lstStyle/>
           <a:p>
             <a:r>
-              <a:rPr lang="en-US" dirty="0"/>
-              <a:t>Login </a:t>
-            </a:r>
-            <a:r>
-              <a:rPr lang="en-US" dirty="0" err="1"/>
-              <a:t>dilakukan</a:t>
-            </a:r>
-            <a:r>
-              <a:rPr lang="en-US" dirty="0"/>
-              <a:t> </a:t>
-            </a:r>
-            <a:r>
-              <a:rPr lang="en-US" dirty="0" err="1"/>
-              <a:t>dengan</a:t>
-            </a:r>
-            <a:r>
-              <a:rPr lang="en-US" dirty="0"/>
-              <a:t> </a:t>
-            </a:r>
-            <a:r>
-              <a:rPr lang="en-US" dirty="0" err="1"/>
-              <a:t>menggunakan</a:t>
-            </a:r>
-            <a:r>
-              <a:rPr lang="en-US" dirty="0"/>
-              <a:t> Firebase </a:t>
-            </a:r>
-            <a:r>
-              <a:rPr lang="en-US" dirty="0" err="1"/>
-              <a:t>authentification</a:t>
+              <a:rPr lang="en-US" dirty="0" err="1"/>
+              <a:t>Digunakan</a:t>
+            </a:r>
+            <a:r>
+              <a:rPr lang="en-US" dirty="0"/>
+              <a:t> </a:t>
+            </a:r>
+            <a:r>
+              <a:rPr lang="en-US" dirty="0" err="1"/>
+              <a:t>untuk</a:t>
+            </a:r>
+            <a:r>
+              <a:rPr lang="en-US" dirty="0"/>
+              <a:t> </a:t>
+            </a:r>
+            <a:r>
+              <a:rPr lang="en-US" dirty="0" err="1"/>
+              <a:t>mendaftar</a:t>
+            </a:r>
+            <a:r>
+              <a:rPr lang="en-US" dirty="0"/>
+              <a:t> </a:t>
+            </a:r>
+            <a:r>
+              <a:rPr lang="en-US" dirty="0" err="1"/>
+              <a:t>ke</a:t>
+            </a:r>
+            <a:r>
+              <a:rPr lang="en-US" dirty="0"/>
+              <a:t> </a:t>
+            </a:r>
+            <a:r>
+              <a:rPr lang="en-US" dirty="0" err="1"/>
+              <a:t>aplikasi</a:t>
             </a:r>
             <a:endParaRPr lang="en-US" dirty="0"/>
           </a:p>
           <a:p>
             <a:r>
               <a:rPr lang="en-US" dirty="0"/>
-              <a:t>Setelah login </a:t>
+              <a:t>Data </a:t>
+            </a:r>
+            <a:r>
+              <a:rPr lang="en-US" dirty="0" err="1"/>
+              <a:t>harus</a:t>
+            </a:r>
+            <a:r>
+              <a:rPr lang="en-US" dirty="0"/>
+              <a:t> </a:t>
+            </a:r>
+            <a:r>
+              <a:rPr lang="en-US" dirty="0" err="1"/>
+              <a:t>dimasukkan</a:t>
+            </a:r>
+            <a:r>
+              <a:rPr lang="en-US" dirty="0"/>
+              <a:t> </a:t>
+            </a:r>
+            <a:r>
+              <a:rPr lang="en-US" dirty="0" err="1"/>
+              <a:t>sesuai</a:t>
+            </a:r>
+            <a:r>
+              <a:rPr lang="en-US" dirty="0"/>
+              <a:t> </a:t>
+            </a:r>
+            <a:r>
+              <a:rPr lang="en-US" dirty="0" err="1"/>
+              <a:t>apa</a:t>
+            </a:r>
+            <a:r>
+              <a:rPr lang="en-US" dirty="0"/>
+              <a:t> yang </a:t>
+            </a:r>
+            <a:r>
+              <a:rPr lang="en-US" dirty="0" err="1"/>
+              <a:t>ada</a:t>
+            </a:r>
+            <a:r>
+              <a:rPr lang="en-US" dirty="0"/>
+              <a:t> pada </a:t>
+            </a:r>
+            <a:r>
+              <a:rPr lang="en-US" dirty="0" err="1"/>
+              <a:t>aplikasi</a:t>
+            </a:r>
+            <a:endParaRPr lang="en-US" dirty="0"/>
+          </a:p>
+          <a:p>
+            <a:r>
+              <a:rPr lang="en-US" dirty="0" err="1"/>
+              <a:t>Apabila</a:t>
+            </a:r>
+            <a:r>
+              <a:rPr lang="en-US" dirty="0"/>
+              <a:t> data </a:t>
+            </a:r>
+            <a:r>
+              <a:rPr lang="en-US" dirty="0" err="1"/>
+              <a:t>kosong</a:t>
+            </a:r>
+            <a:r>
+              <a:rPr lang="en-US" dirty="0"/>
+              <a:t> </a:t>
             </a:r>
             <a:r>
               <a:rPr lang="en-US" dirty="0" err="1"/>
@@ -5380,111 +6078,60 @@
             </a:r>
             <a:r>
               <a:rPr lang="en-US" dirty="0" err="1"/>
-              <a:t>dilakukan</a:t>
-            </a:r>
-            <a:r>
-              <a:rPr lang="en-US" dirty="0"/>
-              <a:t> </a:t>
-            </a:r>
-            <a:r>
-              <a:rPr lang="en-US" dirty="0" err="1"/>
-              <a:t>pemisahan</a:t>
-            </a:r>
-            <a:r>
-              <a:rPr lang="en-US" dirty="0"/>
-              <a:t> </a:t>
-            </a:r>
-            <a:r>
-              <a:rPr lang="en-US" dirty="0" err="1"/>
-              <a:t>sesuai</a:t>
-            </a:r>
-            <a:r>
-              <a:rPr lang="en-US" dirty="0"/>
-              <a:t> </a:t>
-            </a:r>
-            <a:r>
-              <a:rPr lang="en-US" dirty="0" err="1"/>
-              <a:t>dengan</a:t>
-            </a:r>
-            <a:r>
-              <a:rPr lang="en-US" dirty="0"/>
-              <a:t> level </a:t>
-            </a:r>
-            <a:r>
-              <a:rPr lang="en-US" dirty="0" err="1"/>
-              <a:t>akses</a:t>
-            </a:r>
-            <a:r>
-              <a:rPr lang="en-US" dirty="0"/>
-              <a:t>, </a:t>
-            </a:r>
-            <a:r>
-              <a:rPr lang="en-US" dirty="0" err="1"/>
-              <a:t>yaitu</a:t>
-            </a:r>
-            <a:r>
-              <a:rPr lang="en-US" dirty="0"/>
-              <a:t> user dan admin</a:t>
-            </a:r>
-          </a:p>
-          <a:p>
-            <a:r>
-              <a:rPr lang="en-US" dirty="0" err="1"/>
-              <a:t>Terdapat</a:t>
-            </a:r>
-            <a:r>
-              <a:rPr lang="en-US" dirty="0"/>
-              <a:t> menu daftar game, edit user dan log out pada </a:t>
-            </a:r>
-            <a:r>
-              <a:rPr lang="en-US" dirty="0" err="1"/>
-              <a:t>akses</a:t>
-            </a:r>
-            <a:r>
-              <a:rPr lang="en-US" dirty="0"/>
-              <a:t> level user</a:t>
-            </a:r>
-          </a:p>
-          <a:p>
-            <a:r>
-              <a:rPr lang="en-US" dirty="0" err="1"/>
-              <a:t>Terdapat</a:t>
-            </a:r>
-            <a:r>
-              <a:rPr lang="en-US" dirty="0"/>
-              <a:t> menu daftar game, </a:t>
-            </a:r>
-            <a:r>
-              <a:rPr lang="en-US" dirty="0" err="1"/>
-              <a:t>konfirmasi</a:t>
-            </a:r>
-            <a:r>
-              <a:rPr lang="en-US" dirty="0"/>
-              <a:t> history, daftar user, log out dan </a:t>
-            </a:r>
-            <a:r>
-              <a:rPr lang="en-US" dirty="0" err="1"/>
-              <a:t>tambah</a:t>
-            </a:r>
-            <a:r>
-              <a:rPr lang="en-US" dirty="0"/>
-              <a:t> game pada </a:t>
-            </a:r>
-            <a:r>
-              <a:rPr lang="en-US" dirty="0" err="1"/>
-              <a:t>akses</a:t>
-            </a:r>
-            <a:r>
-              <a:rPr lang="en-US" dirty="0"/>
-              <a:t> level admin</a:t>
-            </a:r>
-          </a:p>
-        </p:txBody>
-      </p:sp>
+              <a:t>ada</a:t>
+            </a:r>
+            <a:r>
+              <a:rPr lang="en-US" dirty="0"/>
+              <a:t> </a:t>
+            </a:r>
+            <a:r>
+              <a:rPr lang="en-US" dirty="0" err="1"/>
+              <a:t>pemberitahuan</a:t>
+            </a:r>
+            <a:endParaRPr lang="id-ID" dirty="0"/>
+          </a:p>
+        </p:txBody>
+      </p:sp>
+      <p:pic>
+        <p:nvPicPr>
+          <p:cNvPr id="5" name="Picture 4">
+            <a:extLst>
+              <a:ext uri="{FF2B5EF4-FFF2-40B4-BE49-F238E27FC236}">
+                <a16:creationId xmlns:a16="http://schemas.microsoft.com/office/drawing/2014/main" id="{24790A3B-9305-49B7-A1F8-42B72CF8FC3B}"/>
+              </a:ext>
+            </a:extLst>
+          </p:cNvPr>
+          <p:cNvPicPr>
+            <a:picLocks noChangeAspect="1"/>
+          </p:cNvPicPr>
+          <p:nvPr/>
+        </p:nvPicPr>
+        <p:blipFill>
+          <a:blip r:embed="rId2">
+            <a:extLst>
+              <a:ext uri="{28A0092B-C50C-407E-A947-70E740481C1C}">
+                <a14:useLocalDpi xmlns:a14="http://schemas.microsoft.com/office/drawing/2010/main" val="0"/>
+              </a:ext>
+            </a:extLst>
+          </a:blip>
+          <a:stretch>
+            <a:fillRect/>
+          </a:stretch>
+        </p:blipFill>
+        <p:spPr>
+          <a:xfrm>
+            <a:off x="8943474" y="0"/>
+            <a:ext cx="3248526" cy="6858000"/>
+          </a:xfrm>
+          <a:prstGeom prst="rect">
+            <a:avLst/>
+          </a:prstGeom>
+        </p:spPr>
+      </p:pic>
     </p:spTree>
     <p:extLst>
       <p:ext uri="{BB962C8B-B14F-4D97-AF65-F5344CB8AC3E}">
-        <p14:creationId xmlns:p14="http://schemas.microsoft.com/office/powerpoint/2010/main" val="1685713242"/>
+        <p14:creationId xmlns:p14="http://schemas.microsoft.com/office/powerpoint/2010/main" val="413477081"/>
       </p:ext>
     </p:extLst>
   </p:cSld>
@@ -5516,7 +6163,7 @@
           <p:cNvPr id="2" name="Title 1">
             <a:extLst>
               <a:ext uri="{FF2B5EF4-FFF2-40B4-BE49-F238E27FC236}">
-                <a16:creationId xmlns:a16="http://schemas.microsoft.com/office/drawing/2014/main" id="{C8F93B6F-DDCF-41FB-A0CD-5A300F26D346}"/>
+                <a16:creationId xmlns:a16="http://schemas.microsoft.com/office/drawing/2014/main" id="{73C02C38-7036-478B-A545-FA4F7D21D312}"/>
               </a:ext>
             </a:extLst>
           </p:cNvPr>
@@ -5527,14 +6174,20 @@
             <p:ph type="title"/>
           </p:nvPr>
         </p:nvSpPr>
-        <p:spPr/>
+        <p:spPr>
+          <a:xfrm>
+            <a:off x="3248524" y="365125"/>
+            <a:ext cx="5694949" cy="1325563"/>
+          </a:xfrm>
+        </p:spPr>
         <p:txBody>
           <a:bodyPr/>
           <a:lstStyle/>
           <a:p>
-            <a:r>
-              <a:rPr lang="en-US" dirty="0"/>
-              <a:t>Daftar Game</a:t>
+            <a:pPr algn="ctr"/>
+            <a:r>
+              <a:rPr lang="en-US" dirty="0"/>
+              <a:t>Login dan Dashboard</a:t>
             </a:r>
             <a:endParaRPr lang="id-ID" dirty="0"/>
           </a:p>
@@ -5545,7 +6198,7 @@
           <p:cNvPr id="3" name="Content Placeholder 2">
             <a:extLst>
               <a:ext uri="{FF2B5EF4-FFF2-40B4-BE49-F238E27FC236}">
-                <a16:creationId xmlns:a16="http://schemas.microsoft.com/office/drawing/2014/main" id="{DFADBF40-626A-4AA2-9DAD-3E42EE35837E}"/>
+                <a16:creationId xmlns:a16="http://schemas.microsoft.com/office/drawing/2014/main" id="{DCAF3080-916C-4FB7-ACC5-3FB855708FA0}"/>
               </a:ext>
             </a:extLst>
           </p:cNvPr>
@@ -5556,88 +6209,56 @@
             <p:ph idx="1"/>
           </p:nvPr>
         </p:nvSpPr>
-        <p:spPr/>
-        <p:txBody>
-          <a:bodyPr/>
+        <p:spPr>
+          <a:xfrm>
+            <a:off x="3248526" y="1825624"/>
+            <a:ext cx="5694948" cy="5032375"/>
+          </a:xfrm>
+        </p:spPr>
+        <p:txBody>
+          <a:bodyPr>
+            <a:normAutofit lnSpcReduction="10000"/>
+          </a:bodyPr>
           <a:lstStyle/>
           <a:p>
             <a:r>
               <a:rPr lang="en-US" dirty="0"/>
-              <a:t>Daftar game pada user dan admin </a:t>
-            </a:r>
-            <a:r>
-              <a:rPr lang="en-US" dirty="0" err="1"/>
-              <a:t>sama</a:t>
-            </a:r>
-            <a:r>
-              <a:rPr lang="en-US" dirty="0"/>
-              <a:t> </a:t>
-            </a:r>
-            <a:r>
-              <a:rPr lang="en-US" dirty="0" err="1"/>
-              <a:t>bentuk</a:t>
-            </a:r>
-            <a:r>
-              <a:rPr lang="en-US" dirty="0"/>
-              <a:t> dan </a:t>
-            </a:r>
-            <a:r>
-              <a:rPr lang="en-US" dirty="0" err="1"/>
-              <a:t>isinya</a:t>
+              <a:t>Login </a:t>
+            </a:r>
+            <a:r>
+              <a:rPr lang="en-US" dirty="0" err="1"/>
+              <a:t>dilakukan</a:t>
+            </a:r>
+            <a:r>
+              <a:rPr lang="en-US" dirty="0"/>
+              <a:t> </a:t>
+            </a:r>
+            <a:r>
+              <a:rPr lang="en-US" dirty="0" err="1"/>
+              <a:t>dengan</a:t>
+            </a:r>
+            <a:r>
+              <a:rPr lang="en-US" dirty="0"/>
+              <a:t> </a:t>
+            </a:r>
+            <a:r>
+              <a:rPr lang="en-US" dirty="0" err="1"/>
+              <a:t>menggunakan</a:t>
+            </a:r>
+            <a:r>
+              <a:rPr lang="en-US" dirty="0"/>
+              <a:t> Firebase </a:t>
+            </a:r>
+            <a:r>
+              <a:rPr lang="en-US" dirty="0" err="1"/>
+              <a:t>authentification</a:t>
             </a:r>
             <a:endParaRPr lang="en-US" dirty="0"/>
           </a:p>
           <a:p>
             <a:r>
               <a:rPr lang="en-US" dirty="0"/>
-              <a:t>Daftar game </a:t>
-            </a:r>
-            <a:r>
-              <a:rPr lang="en-US" dirty="0" err="1"/>
-              <a:t>dipisah</a:t>
-            </a:r>
-            <a:r>
-              <a:rPr lang="en-US" dirty="0"/>
-              <a:t> </a:t>
-            </a:r>
-            <a:r>
-              <a:rPr lang="en-US" dirty="0" err="1"/>
-              <a:t>menjadi</a:t>
-            </a:r>
-            <a:r>
-              <a:rPr lang="en-US" dirty="0"/>
-              <a:t> 3 </a:t>
-            </a:r>
-            <a:r>
-              <a:rPr lang="en-US" dirty="0" err="1"/>
-              <a:t>kategori</a:t>
-            </a:r>
-            <a:endParaRPr lang="en-US" dirty="0"/>
-          </a:p>
-          <a:p>
-            <a:r>
-              <a:rPr lang="en-US" dirty="0" err="1"/>
-              <a:t>Saat</a:t>
-            </a:r>
-            <a:r>
-              <a:rPr lang="en-US" dirty="0"/>
-              <a:t> salah </a:t>
-            </a:r>
-            <a:r>
-              <a:rPr lang="en-US" dirty="0" err="1"/>
-              <a:t>satu</a:t>
-            </a:r>
-            <a:r>
-              <a:rPr lang="en-US" dirty="0"/>
-              <a:t> game pada daftar game di </a:t>
-            </a:r>
-            <a:r>
-              <a:rPr lang="en-US" dirty="0" err="1"/>
-              <a:t>pilih</a:t>
-            </a:r>
-            <a:r>
-              <a:rPr lang="en-US" dirty="0"/>
-              <a:t> </a:t>
+              <a:t>Setelah login </a:t>
             </a:r>
             <a:r>
               <a:rPr lang="en-US" dirty="0" err="1"/>
@@ -5657,28 +6278,225 @@
             </a:r>
             <a:r>
               <a:rPr lang="en-US" dirty="0" err="1"/>
-              <a:t>tampil</a:t>
-            </a:r>
-            <a:r>
-              <a:rPr lang="en-US" dirty="0"/>
-              <a:t> detail </a:t>
-            </a:r>
-            <a:r>
-              <a:rPr lang="en-US" dirty="0" err="1"/>
-              <a:t>dari</a:t>
-            </a:r>
-            <a:r>
-              <a:rPr lang="en-US" dirty="0"/>
-              <a:t> game</a:t>
-            </a:r>
-            <a:endParaRPr lang="id-ID" dirty="0"/>
-          </a:p>
-        </p:txBody>
-      </p:sp>
+              <a:t>dilakukan</a:t>
+            </a:r>
+            <a:r>
+              <a:rPr lang="en-US" dirty="0"/>
+              <a:t> </a:t>
+            </a:r>
+            <a:r>
+              <a:rPr lang="en-US" dirty="0" err="1"/>
+              <a:t>pemisahan</a:t>
+            </a:r>
+            <a:r>
+              <a:rPr lang="en-US" dirty="0"/>
+              <a:t> </a:t>
+            </a:r>
+            <a:r>
+              <a:rPr lang="en-US" dirty="0" err="1"/>
+              <a:t>sesuai</a:t>
+            </a:r>
+            <a:r>
+              <a:rPr lang="en-US" dirty="0"/>
+              <a:t> </a:t>
+            </a:r>
+            <a:r>
+              <a:rPr lang="en-US" dirty="0" err="1"/>
+              <a:t>dengan</a:t>
+            </a:r>
+            <a:r>
+              <a:rPr lang="en-US" dirty="0"/>
+              <a:t> level </a:t>
+            </a:r>
+            <a:r>
+              <a:rPr lang="en-US" dirty="0" err="1"/>
+              <a:t>akses</a:t>
+            </a:r>
+            <a:r>
+              <a:rPr lang="en-US" dirty="0"/>
+              <a:t>, </a:t>
+            </a:r>
+            <a:r>
+              <a:rPr lang="en-US" dirty="0" err="1"/>
+              <a:t>yaitu</a:t>
+            </a:r>
+            <a:r>
+              <a:rPr lang="en-US" dirty="0"/>
+              <a:t> </a:t>
+            </a:r>
+            <a:r>
+              <a:rPr lang="id-ID" dirty="0"/>
+              <a:t>client</a:t>
+            </a:r>
+            <a:r>
+              <a:rPr lang="en-US" dirty="0"/>
+              <a:t> dan admin</a:t>
+            </a:r>
+          </a:p>
+          <a:p>
+            <a:r>
+              <a:rPr lang="en-US" dirty="0" err="1"/>
+              <a:t>Terdapat</a:t>
+            </a:r>
+            <a:r>
+              <a:rPr lang="en-US" dirty="0"/>
+              <a:t> menu daftar game, edit user dan log out pada </a:t>
+            </a:r>
+            <a:r>
+              <a:rPr lang="en-US" dirty="0" err="1"/>
+              <a:t>akses</a:t>
+            </a:r>
+            <a:r>
+              <a:rPr lang="en-US" dirty="0"/>
+              <a:t> level user</a:t>
+            </a:r>
+          </a:p>
+          <a:p>
+            <a:r>
+              <a:rPr lang="en-US" dirty="0" err="1"/>
+              <a:t>Terdapat</a:t>
+            </a:r>
+            <a:r>
+              <a:rPr lang="en-US" dirty="0"/>
+              <a:t> menu daftar game, </a:t>
+            </a:r>
+            <a:r>
+              <a:rPr lang="en-US" dirty="0" err="1"/>
+              <a:t>konfirmasi</a:t>
+            </a:r>
+            <a:r>
+              <a:rPr lang="en-US" dirty="0"/>
+              <a:t> history, daftar user, log out dan </a:t>
+            </a:r>
+            <a:r>
+              <a:rPr lang="en-US" dirty="0" err="1"/>
+              <a:t>tambah</a:t>
+            </a:r>
+            <a:r>
+              <a:rPr lang="en-US" dirty="0"/>
+              <a:t> game pada </a:t>
+            </a:r>
+            <a:r>
+              <a:rPr lang="en-US" dirty="0" err="1"/>
+              <a:t>akses</a:t>
+            </a:r>
+            <a:r>
+              <a:rPr lang="en-US" dirty="0"/>
+              <a:t> level admin</a:t>
+            </a:r>
+          </a:p>
+        </p:txBody>
+      </p:sp>
+      <p:pic>
+        <p:nvPicPr>
+          <p:cNvPr id="5" name="Picture 4">
+            <a:extLst>
+              <a:ext uri="{FF2B5EF4-FFF2-40B4-BE49-F238E27FC236}">
+                <a16:creationId xmlns:a16="http://schemas.microsoft.com/office/drawing/2014/main" id="{D1D1D5F6-9CB5-4D7A-A820-0046A5E4A269}"/>
+              </a:ext>
+            </a:extLst>
+          </p:cNvPr>
+          <p:cNvPicPr>
+            <a:picLocks noChangeAspect="1"/>
+          </p:cNvPicPr>
+          <p:nvPr/>
+        </p:nvPicPr>
+        <p:blipFill rotWithShape="1">
+          <a:blip r:embed="rId2">
+            <a:extLst>
+              <a:ext uri="{28A0092B-C50C-407E-A947-70E740481C1C}">
+                <a14:useLocalDpi xmlns:a14="http://schemas.microsoft.com/office/drawing/2010/main" val="0"/>
+              </a:ext>
+            </a:extLst>
+          </a:blip>
+          <a:srcRect b="11812"/>
+          <a:stretch/>
+        </p:blipFill>
+        <p:spPr>
+          <a:xfrm>
+            <a:off x="8943474" y="0"/>
+            <a:ext cx="3248526" cy="5814000"/>
+          </a:xfrm>
+          <a:prstGeom prst="rect">
+            <a:avLst/>
+          </a:prstGeom>
+        </p:spPr>
+      </p:pic>
+      <p:pic>
+        <p:nvPicPr>
+          <p:cNvPr id="7" name="Picture 6">
+            <a:extLst>
+              <a:ext uri="{FF2B5EF4-FFF2-40B4-BE49-F238E27FC236}">
+                <a16:creationId xmlns:a16="http://schemas.microsoft.com/office/drawing/2014/main" id="{5B883454-171D-451F-B924-E838D8969090}"/>
+              </a:ext>
+            </a:extLst>
+          </p:cNvPr>
+          <p:cNvPicPr>
+            <a:picLocks noChangeAspect="1"/>
+          </p:cNvPicPr>
+          <p:nvPr/>
+        </p:nvPicPr>
+        <p:blipFill rotWithShape="1">
+          <a:blip r:embed="rId3">
+            <a:extLst>
+              <a:ext uri="{28A0092B-C50C-407E-A947-70E740481C1C}">
+                <a14:useLocalDpi xmlns:a14="http://schemas.microsoft.com/office/drawing/2010/main" val="0"/>
+              </a:ext>
+            </a:extLst>
+          </a:blip>
+          <a:srcRect t="85048" b="-270"/>
+          <a:stretch/>
+        </p:blipFill>
+        <p:spPr>
+          <a:xfrm>
+            <a:off x="8943474" y="5814000"/>
+            <a:ext cx="3248526" cy="1044000"/>
+          </a:xfrm>
+          <a:prstGeom prst="rect">
+            <a:avLst/>
+          </a:prstGeom>
+        </p:spPr>
+      </p:pic>
+      <p:pic>
+        <p:nvPicPr>
+          <p:cNvPr id="11" name="Picture 10">
+            <a:extLst>
+              <a:ext uri="{FF2B5EF4-FFF2-40B4-BE49-F238E27FC236}">
+                <a16:creationId xmlns:a16="http://schemas.microsoft.com/office/drawing/2014/main" id="{D0163445-A9C0-4E4C-810C-69F5A07AD605}"/>
+              </a:ext>
+            </a:extLst>
+          </p:cNvPr>
+          <p:cNvPicPr>
+            <a:picLocks noChangeAspect="1"/>
+          </p:cNvPicPr>
+          <p:nvPr/>
+        </p:nvPicPr>
+        <p:blipFill>
+          <a:blip r:embed="rId4">
+            <a:extLst>
+              <a:ext uri="{28A0092B-C50C-407E-A947-70E740481C1C}">
+                <a14:useLocalDpi xmlns:a14="http://schemas.microsoft.com/office/drawing/2010/main" val="0"/>
+              </a:ext>
+            </a:extLst>
+          </a:blip>
+          <a:stretch>
+            <a:fillRect/>
+          </a:stretch>
+        </p:blipFill>
+        <p:spPr>
+          <a:xfrm>
+            <a:off x="0" y="-1"/>
+            <a:ext cx="3248526" cy="6858000"/>
+          </a:xfrm>
+          <a:prstGeom prst="rect">
+            <a:avLst/>
+          </a:prstGeom>
+        </p:spPr>
+      </p:pic>
     </p:spTree>
     <p:extLst>
       <p:ext uri="{BB962C8B-B14F-4D97-AF65-F5344CB8AC3E}">
-        <p14:creationId xmlns:p14="http://schemas.microsoft.com/office/powerpoint/2010/main" val="1399801223"/>
+        <p14:creationId xmlns:p14="http://schemas.microsoft.com/office/powerpoint/2010/main" val="1685713242"/>
       </p:ext>
     </p:extLst>
   </p:cSld>
@@ -5710,7 +6528,7 @@
           <p:cNvPr id="2" name="Title 1">
             <a:extLst>
               <a:ext uri="{FF2B5EF4-FFF2-40B4-BE49-F238E27FC236}">
-                <a16:creationId xmlns:a16="http://schemas.microsoft.com/office/drawing/2014/main" id="{8A217B68-8285-4008-B643-E822E703BD05}"/>
+                <a16:creationId xmlns:a16="http://schemas.microsoft.com/office/drawing/2014/main" id="{C8F93B6F-DDCF-41FB-A0CD-5A300F26D346}"/>
               </a:ext>
             </a:extLst>
           </p:cNvPr>
@@ -5728,7 +6546,7 @@
           <a:p>
             <a:r>
               <a:rPr lang="en-US" dirty="0"/>
-              <a:t>Detail Game</a:t>
+              <a:t>Daftar Game</a:t>
             </a:r>
             <a:endParaRPr lang="id-ID" dirty="0"/>
           </a:p>
@@ -5739,7 +6557,7 @@
           <p:cNvPr id="3" name="Content Placeholder 2">
             <a:extLst>
               <a:ext uri="{FF2B5EF4-FFF2-40B4-BE49-F238E27FC236}">
-                <a16:creationId xmlns:a16="http://schemas.microsoft.com/office/drawing/2014/main" id="{32BBB943-5CD3-40AA-8FFB-A8C1C1177C42}"/>
+                <a16:creationId xmlns:a16="http://schemas.microsoft.com/office/drawing/2014/main" id="{DFADBF40-626A-4AA2-9DAD-3E42EE35837E}"/>
               </a:ext>
             </a:extLst>
           </p:cNvPr>
@@ -5750,22 +6568,27 @@
             <p:ph idx="1"/>
           </p:nvPr>
         </p:nvSpPr>
-        <p:spPr/>
+        <p:spPr>
+          <a:xfrm>
+            <a:off x="838200" y="1825625"/>
+            <a:ext cx="8105274" cy="4351338"/>
+          </a:xfrm>
+        </p:spPr>
         <p:txBody>
           <a:bodyPr/>
           <a:lstStyle/>
           <a:p>
             <a:r>
               <a:rPr lang="en-US" dirty="0"/>
-              <a:t>Pada user dan admin detail  game </a:t>
-            </a:r>
-            <a:r>
-              <a:rPr lang="en-US" dirty="0" err="1"/>
-              <a:t>berisi</a:t>
-            </a:r>
-            <a:r>
-              <a:rPr lang="en-US" dirty="0"/>
-              <a:t> </a:t>
+              <a:t>Daftar game pada </a:t>
+            </a:r>
+            <a:r>
+              <a:rPr lang="id-ID" dirty="0"/>
+              <a:t>client</a:t>
+            </a:r>
+            <a:r>
+              <a:rPr lang="en-US" dirty="0"/>
+              <a:t> dan admin </a:t>
             </a:r>
             <a:r>
               <a:rPr lang="en-US" dirty="0" err="1"/>
@@ -5777,89 +6600,184 @@
             </a:r>
             <a:r>
               <a:rPr lang="en-US" dirty="0" err="1"/>
-              <a:t>hanya</a:t>
-            </a:r>
-            <a:r>
-              <a:rPr lang="en-US" dirty="0"/>
-              <a:t> </a:t>
-            </a:r>
-            <a:r>
-              <a:rPr lang="en-US" dirty="0" err="1"/>
-              <a:t>saja</a:t>
-            </a:r>
-            <a:r>
-              <a:rPr lang="en-US" dirty="0"/>
-              <a:t> button pada detail </a:t>
-            </a:r>
-            <a:r>
-              <a:rPr lang="en-US" dirty="0" err="1"/>
-              <a:t>berbeda</a:t>
+              <a:t>bentuk</a:t>
+            </a:r>
+            <a:r>
+              <a:rPr lang="en-US" dirty="0"/>
+              <a:t> dan </a:t>
+            </a:r>
+            <a:r>
+              <a:rPr lang="en-US" dirty="0" err="1"/>
+              <a:t>isinya</a:t>
             </a:r>
             <a:endParaRPr lang="en-US" dirty="0"/>
           </a:p>
           <a:p>
             <a:r>
               <a:rPr lang="en-US" dirty="0"/>
-              <a:t>Pada detail game user, button yang </a:t>
-            </a:r>
-            <a:r>
-              <a:rPr lang="en-US" dirty="0" err="1"/>
-              <a:t>tersedia</a:t>
-            </a:r>
-            <a:r>
-              <a:rPr lang="en-US" dirty="0"/>
-              <a:t> </a:t>
-            </a:r>
-            <a:r>
-              <a:rPr lang="en-US" dirty="0" err="1"/>
-              <a:t>adalah</a:t>
-            </a:r>
-            <a:r>
-              <a:rPr lang="en-US" dirty="0"/>
-              <a:t> leaderboard dan  </a:t>
-            </a:r>
-            <a:r>
-              <a:rPr lang="en-US" dirty="0" err="1"/>
-              <a:t>tambah</a:t>
-            </a:r>
-            <a:r>
-              <a:rPr lang="en-US" dirty="0"/>
-              <a:t> history</a:t>
-            </a:r>
-          </a:p>
-          <a:p>
-            <a:r>
-              <a:rPr lang="en-US" dirty="0"/>
-              <a:t>Pada detail game admin, button yang </a:t>
-            </a:r>
-            <a:r>
-              <a:rPr lang="en-US" dirty="0" err="1"/>
-              <a:t>tersedia</a:t>
-            </a:r>
-            <a:r>
-              <a:rPr lang="en-US" dirty="0"/>
-              <a:t> </a:t>
-            </a:r>
-            <a:r>
-              <a:rPr lang="en-US" dirty="0" err="1"/>
-              <a:t>adalah</a:t>
-            </a:r>
-            <a:r>
-              <a:rPr lang="en-US" dirty="0"/>
-              <a:t> </a:t>
-            </a:r>
-            <a:r>
-              <a:rPr lang="en-US" dirty="0" err="1"/>
-              <a:t>lederboard</a:t>
+              <a:t>Daftar game </a:t>
+            </a:r>
+            <a:r>
+              <a:rPr lang="en-US" dirty="0" err="1"/>
+              <a:t>dipisah</a:t>
+            </a:r>
+            <a:r>
+              <a:rPr lang="en-US" dirty="0"/>
+              <a:t> </a:t>
+            </a:r>
+            <a:r>
+              <a:rPr lang="en-US" dirty="0" err="1"/>
+              <a:t>menjadi</a:t>
+            </a:r>
+            <a:r>
+              <a:rPr lang="en-US" dirty="0"/>
+              <a:t> 3 </a:t>
+            </a:r>
+            <a:r>
+              <a:rPr lang="en-US" dirty="0" err="1"/>
+              <a:t>kategori</a:t>
+            </a:r>
+            <a:r>
+              <a:rPr lang="id-ID" dirty="0"/>
+              <a:t> (easy, medium, dan hard)</a:t>
+            </a:r>
+            <a:endParaRPr lang="en-US" dirty="0"/>
+          </a:p>
+          <a:p>
+            <a:r>
+              <a:rPr lang="en-US" dirty="0" err="1"/>
+              <a:t>Saat</a:t>
+            </a:r>
+            <a:r>
+              <a:rPr lang="en-US" dirty="0"/>
+              <a:t> salah </a:t>
+            </a:r>
+            <a:r>
+              <a:rPr lang="en-US" dirty="0" err="1"/>
+              <a:t>satu</a:t>
+            </a:r>
+            <a:r>
+              <a:rPr lang="en-US" dirty="0"/>
+              <a:t> game pada daftar game di </a:t>
+            </a:r>
+            <a:r>
+              <a:rPr lang="en-US" dirty="0" err="1"/>
+              <a:t>pilih</a:t>
+            </a:r>
+            <a:r>
+              <a:rPr lang="en-US" dirty="0"/>
+              <a:t> </a:t>
+            </a:r>
+            <a:r>
+              <a:rPr lang="en-US" dirty="0" err="1"/>
+              <a:t>maka</a:t>
+            </a:r>
+            <a:r>
+              <a:rPr lang="en-US" dirty="0"/>
+              <a:t> </a:t>
+            </a:r>
+            <a:r>
+              <a:rPr lang="en-US" dirty="0" err="1"/>
+              <a:t>akan</a:t>
+            </a:r>
+            <a:r>
+              <a:rPr lang="en-US" dirty="0"/>
+              <a:t> </a:t>
+            </a:r>
+            <a:r>
+              <a:rPr lang="en-US" dirty="0" err="1"/>
+              <a:t>tampil</a:t>
+            </a:r>
+            <a:r>
+              <a:rPr lang="en-US" dirty="0"/>
+              <a:t> detail </a:t>
+            </a:r>
+            <a:r>
+              <a:rPr lang="en-US" dirty="0" err="1"/>
+              <a:t>dari</a:t>
+            </a:r>
+            <a:r>
+              <a:rPr lang="en-US" dirty="0"/>
+              <a:t> game</a:t>
             </a:r>
             <a:endParaRPr lang="id-ID" dirty="0"/>
           </a:p>
         </p:txBody>
       </p:sp>
+      <p:pic>
+        <p:nvPicPr>
+          <p:cNvPr id="5" name="Picture 4">
+            <a:extLst>
+              <a:ext uri="{FF2B5EF4-FFF2-40B4-BE49-F238E27FC236}">
+                <a16:creationId xmlns:a16="http://schemas.microsoft.com/office/drawing/2014/main" id="{2958D111-482D-4DA7-ABDB-B7838C20D323}"/>
+              </a:ext>
+            </a:extLst>
+          </p:cNvPr>
+          <p:cNvPicPr>
+            <a:picLocks noChangeAspect="1"/>
+          </p:cNvPicPr>
+          <p:nvPr/>
+        </p:nvPicPr>
+        <p:blipFill rotWithShape="1">
+          <a:blip r:embed="rId2">
+            <a:extLst>
+              <a:ext uri="{28A0092B-C50C-407E-A947-70E740481C1C}">
+                <a14:useLocalDpi xmlns:a14="http://schemas.microsoft.com/office/drawing/2010/main" val="0"/>
+              </a:ext>
+            </a:extLst>
+          </a:blip>
+          <a:srcRect t="1" b="5399"/>
+          <a:stretch/>
+        </p:blipFill>
+        <p:spPr>
+          <a:xfrm>
+            <a:off x="8943474" y="-1"/>
+            <a:ext cx="3248526" cy="4698609"/>
+          </a:xfrm>
+          <a:prstGeom prst="rect">
+            <a:avLst/>
+          </a:prstGeom>
+        </p:spPr>
+      </p:pic>
+      <p:pic>
+        <p:nvPicPr>
+          <p:cNvPr id="9" name="Picture 8">
+            <a:extLst>
+              <a:ext uri="{FF2B5EF4-FFF2-40B4-BE49-F238E27FC236}">
+                <a16:creationId xmlns:a16="http://schemas.microsoft.com/office/drawing/2014/main" id="{E9A33374-F83B-4F2A-8803-3E168BDC5D58}"/>
+              </a:ext>
+            </a:extLst>
+          </p:cNvPr>
+          <p:cNvPicPr>
+            <a:picLocks noChangeAspect="1"/>
+          </p:cNvPicPr>
+          <p:nvPr/>
+        </p:nvPicPr>
+        <p:blipFill rotWithShape="1">
+          <a:blip r:embed="rId3">
+            <a:extLst>
+              <a:ext uri="{28A0092B-C50C-407E-A947-70E740481C1C}">
+                <a14:useLocalDpi xmlns:a14="http://schemas.microsoft.com/office/drawing/2010/main" val="0"/>
+              </a:ext>
+            </a:extLst>
+          </a:blip>
+          <a:srcRect t="64065" b="-291"/>
+          <a:stretch/>
+        </p:blipFill>
+        <p:spPr>
+          <a:xfrm>
+            <a:off x="8943474" y="4698608"/>
+            <a:ext cx="3248526" cy="2159392"/>
+          </a:xfrm>
+          <a:prstGeom prst="rect">
+            <a:avLst/>
+          </a:prstGeom>
+        </p:spPr>
+      </p:pic>
     </p:spTree>
     <p:extLst>
       <p:ext uri="{BB962C8B-B14F-4D97-AF65-F5344CB8AC3E}">
-        <p14:creationId xmlns:p14="http://schemas.microsoft.com/office/powerpoint/2010/main" val="24565309"/>
+        <p14:creationId xmlns:p14="http://schemas.microsoft.com/office/powerpoint/2010/main" val="1399801223"/>
       </p:ext>
     </p:extLst>
   </p:cSld>
@@ -5891,7 +6809,7 @@
           <p:cNvPr id="2" name="Title 1">
             <a:extLst>
               <a:ext uri="{FF2B5EF4-FFF2-40B4-BE49-F238E27FC236}">
-                <a16:creationId xmlns:a16="http://schemas.microsoft.com/office/drawing/2014/main" id="{DB1C758F-34C4-4CB2-A59F-F12226BD31A2}"/>
+                <a16:creationId xmlns:a16="http://schemas.microsoft.com/office/drawing/2014/main" id="{8A217B68-8285-4008-B643-E822E703BD05}"/>
               </a:ext>
             </a:extLst>
           </p:cNvPr>
@@ -5907,9 +6825,10 @@
           <a:bodyPr/>
           <a:lstStyle/>
           <a:p>
-            <a:r>
-              <a:rPr lang="en-US" dirty="0"/>
-              <a:t>Leaderboard</a:t>
+            <a:pPr algn="ctr"/>
+            <a:r>
+              <a:rPr lang="en-US" dirty="0"/>
+              <a:t>Detail Game</a:t>
             </a:r>
             <a:endParaRPr lang="id-ID" dirty="0"/>
           </a:p>
@@ -5920,7 +6839,7 @@
           <p:cNvPr id="3" name="Content Placeholder 2">
             <a:extLst>
               <a:ext uri="{FF2B5EF4-FFF2-40B4-BE49-F238E27FC236}">
-                <a16:creationId xmlns:a16="http://schemas.microsoft.com/office/drawing/2014/main" id="{152C5B50-D56B-41B4-AE64-140DC7E15213}"/>
+                <a16:creationId xmlns:a16="http://schemas.microsoft.com/office/drawing/2014/main" id="{32BBB943-5CD3-40AA-8FFB-A8C1C1177C42}"/>
               </a:ext>
             </a:extLst>
           </p:cNvPr>
@@ -5931,129 +6850,78 @@
             <p:ph idx="1"/>
           </p:nvPr>
         </p:nvSpPr>
-        <p:spPr/>
-        <p:txBody>
-          <a:bodyPr>
-            <a:normAutofit lnSpcReduction="10000"/>
-          </a:bodyPr>
+        <p:spPr>
+          <a:xfrm>
+            <a:off x="3248526" y="1825625"/>
+            <a:ext cx="5694947" cy="4351338"/>
+          </a:xfrm>
+        </p:spPr>
+        <p:txBody>
+          <a:bodyPr/>
           <a:lstStyle/>
           <a:p>
             <a:r>
               <a:rPr lang="en-US" dirty="0"/>
-              <a:t>Pada user dan admin leaderboard </a:t>
-            </a:r>
-            <a:r>
-              <a:rPr lang="en-US" dirty="0" err="1"/>
-              <a:t>dapat</a:t>
-            </a:r>
-            <a:r>
-              <a:rPr lang="en-US" dirty="0"/>
-              <a:t> </a:t>
-            </a:r>
-            <a:r>
-              <a:rPr lang="en-US" dirty="0" err="1"/>
-              <a:t>diakses</a:t>
-            </a:r>
-            <a:r>
-              <a:rPr lang="en-US" dirty="0"/>
-              <a:t> </a:t>
-            </a:r>
-            <a:r>
-              <a:rPr lang="en-US" dirty="0" err="1"/>
-              <a:t>setelah</a:t>
-            </a:r>
-            <a:r>
-              <a:rPr lang="en-US" dirty="0"/>
-              <a:t> </a:t>
-            </a:r>
-            <a:r>
-              <a:rPr lang="en-US" dirty="0" err="1"/>
-              <a:t>memilih</a:t>
-            </a:r>
-            <a:r>
-              <a:rPr lang="en-US" dirty="0"/>
-              <a:t> game dan </a:t>
-            </a:r>
-            <a:r>
-              <a:rPr lang="en-US" dirty="0" err="1"/>
-              <a:t>melihat</a:t>
-            </a:r>
-            <a:r>
-              <a:rPr lang="en-US" dirty="0"/>
-              <a:t> detail game</a:t>
-            </a:r>
-          </a:p>
-          <a:p>
-            <a:r>
-              <a:rPr lang="en-US" dirty="0"/>
-              <a:t>Hal </a:t>
-            </a:r>
-            <a:r>
-              <a:rPr lang="en-US" dirty="0" err="1"/>
-              <a:t>ini</a:t>
-            </a:r>
-            <a:r>
-              <a:rPr lang="en-US" dirty="0"/>
-              <a:t> </a:t>
-            </a:r>
-            <a:r>
-              <a:rPr lang="en-US" dirty="0" err="1"/>
-              <a:t>dilakukan</a:t>
-            </a:r>
-            <a:r>
-              <a:rPr lang="en-US" dirty="0"/>
-              <a:t> </a:t>
-            </a:r>
-            <a:r>
-              <a:rPr lang="en-US" dirty="0" err="1"/>
-              <a:t>untuk</a:t>
-            </a:r>
-            <a:r>
-              <a:rPr lang="en-US" dirty="0"/>
-              <a:t> </a:t>
-            </a:r>
-            <a:r>
-              <a:rPr lang="en-US" dirty="0" err="1"/>
-              <a:t>mempermudah</a:t>
-            </a:r>
-            <a:r>
-              <a:rPr lang="en-US" dirty="0"/>
-              <a:t> </a:t>
-            </a:r>
-            <a:r>
-              <a:rPr lang="en-US" dirty="0" err="1"/>
-              <a:t>pendataan</a:t>
-            </a:r>
-            <a:r>
-              <a:rPr lang="en-US" dirty="0"/>
-              <a:t> leaderboard </a:t>
-            </a:r>
-            <a:r>
-              <a:rPr lang="en-US" dirty="0" err="1"/>
-              <a:t>berdasarkan</a:t>
-            </a:r>
-            <a:r>
-              <a:rPr lang="en-US" dirty="0"/>
-              <a:t> game yang </a:t>
+              <a:t>Pada </a:t>
+            </a:r>
+            <a:r>
+              <a:rPr lang="id-ID" dirty="0"/>
+              <a:t>client</a:t>
+            </a:r>
+            <a:r>
+              <a:rPr lang="en-US" dirty="0"/>
+              <a:t> dan admin detail game </a:t>
+            </a:r>
+            <a:r>
+              <a:rPr lang="en-US" dirty="0" err="1"/>
+              <a:t>berisi</a:t>
+            </a:r>
+            <a:r>
+              <a:rPr lang="en-US" dirty="0"/>
+              <a:t> </a:t>
             </a:r>
             <a:r>
               <a:rPr lang="en-US" dirty="0" err="1"/>
               <a:t>sama</a:t>
             </a:r>
+            <a:r>
+              <a:rPr lang="en-US" dirty="0"/>
+              <a:t> </a:t>
+            </a:r>
+            <a:r>
+              <a:rPr lang="en-US" dirty="0" err="1"/>
+              <a:t>hanya</a:t>
+            </a:r>
+            <a:r>
+              <a:rPr lang="en-US" dirty="0"/>
+              <a:t> </a:t>
+            </a:r>
+            <a:r>
+              <a:rPr lang="en-US" dirty="0" err="1"/>
+              <a:t>saja</a:t>
+            </a:r>
+            <a:r>
+              <a:rPr lang="en-US" dirty="0"/>
+              <a:t> button pada detail </a:t>
+            </a:r>
+            <a:r>
+              <a:rPr lang="en-US" dirty="0" err="1"/>
+              <a:t>berbeda</a:t>
+            </a:r>
             <a:endParaRPr lang="en-US" dirty="0"/>
           </a:p>
           <a:p>
             <a:r>
               <a:rPr lang="en-US" dirty="0"/>
-              <a:t>Isi </a:t>
-            </a:r>
-            <a:r>
-              <a:rPr lang="en-US" dirty="0" err="1"/>
-              <a:t>dari</a:t>
-            </a:r>
-            <a:r>
-              <a:rPr lang="en-US" dirty="0"/>
-              <a:t> leaderboard </a:t>
+              <a:t>Pada detail game user, button yang </a:t>
+            </a:r>
+            <a:r>
+              <a:rPr lang="en-US" dirty="0" err="1"/>
+              <a:t>tersedia</a:t>
+            </a:r>
+            <a:r>
+              <a:rPr lang="en-US" dirty="0"/>
+              <a:t> </a:t>
             </a:r>
             <a:r>
               <a:rPr lang="en-US" dirty="0" err="1"/>
@@ -6061,198 +6929,126 @@
             </a:r>
             <a:r>
               <a:rPr lang="en-US" dirty="0"/>
-              <a:t> data </a:t>
-            </a:r>
-            <a:r>
-              <a:rPr lang="en-US" dirty="0" err="1"/>
-              <a:t>berupa</a:t>
-            </a:r>
-            <a:r>
-              <a:rPr lang="en-US" dirty="0"/>
-              <a:t> </a:t>
-            </a:r>
-            <a:r>
-              <a:rPr lang="en-US" dirty="0" err="1"/>
-              <a:t>nama,menang</a:t>
-            </a:r>
-            <a:r>
-              <a:rPr lang="en-US" dirty="0"/>
-              <a:t>, </a:t>
-            </a:r>
-            <a:r>
-              <a:rPr lang="en-US" dirty="0" err="1"/>
-              <a:t>kalah</a:t>
-            </a:r>
-            <a:r>
-              <a:rPr lang="en-US" dirty="0"/>
-              <a:t>, </a:t>
-            </a:r>
-            <a:r>
-              <a:rPr lang="en-US" dirty="0" err="1"/>
-              <a:t>hari</a:t>
-            </a:r>
-            <a:r>
-              <a:rPr lang="en-US" dirty="0"/>
-              <a:t>, </a:t>
-            </a:r>
-            <a:r>
-              <a:rPr lang="en-US" dirty="0" err="1"/>
-              <a:t>bulan</a:t>
-            </a:r>
-            <a:r>
-              <a:rPr lang="en-US" dirty="0"/>
-              <a:t> dan </a:t>
-            </a:r>
-            <a:r>
-              <a:rPr lang="en-US" dirty="0" err="1"/>
-              <a:t>tahun</a:t>
-            </a:r>
-            <a:endParaRPr lang="en-US" dirty="0"/>
-          </a:p>
-          <a:p>
-            <a:r>
-              <a:rPr lang="en-US" dirty="0"/>
-              <a:t>Isi pada </a:t>
-            </a:r>
-            <a:r>
-              <a:rPr lang="en-US" dirty="0" err="1"/>
-              <a:t>lederboard</a:t>
-            </a:r>
-            <a:r>
-              <a:rPr lang="en-US" dirty="0"/>
-              <a:t> </a:t>
-            </a:r>
-            <a:r>
-              <a:rPr lang="en-US" dirty="0" err="1"/>
-              <a:t>berupa</a:t>
-            </a:r>
-            <a:r>
-              <a:rPr lang="en-US" dirty="0"/>
-              <a:t> </a:t>
-            </a:r>
-            <a:r>
-              <a:rPr lang="en-US" dirty="0" err="1"/>
-              <a:t>poin</a:t>
-            </a:r>
-            <a:r>
-              <a:rPr lang="en-US" dirty="0"/>
-              <a:t> yang </a:t>
-            </a:r>
-            <a:r>
-              <a:rPr lang="en-US" dirty="0" err="1"/>
-              <a:t>didapatkan</a:t>
-            </a:r>
-            <a:r>
-              <a:rPr lang="en-US" dirty="0"/>
-              <a:t> </a:t>
-            </a:r>
-            <a:r>
-              <a:rPr lang="en-US" dirty="0" err="1"/>
-              <a:t>berdasarkan</a:t>
-            </a:r>
-            <a:r>
-              <a:rPr lang="en-US" dirty="0"/>
-              <a:t> </a:t>
-            </a:r>
-            <a:r>
-              <a:rPr lang="en-US" dirty="0" err="1"/>
-              <a:t>menang</a:t>
-            </a:r>
-            <a:r>
-              <a:rPr lang="en-US" dirty="0"/>
-              <a:t> dan </a:t>
-            </a:r>
-            <a:r>
-              <a:rPr lang="en-US" dirty="0" err="1"/>
-              <a:t>kalah</a:t>
-            </a:r>
-            <a:endParaRPr lang="en-US" dirty="0"/>
-          </a:p>
-          <a:p>
-            <a:r>
-              <a:rPr lang="en-US" dirty="0"/>
-              <a:t>Pada admin leaderboard </a:t>
-            </a:r>
-            <a:r>
-              <a:rPr lang="en-US" dirty="0" err="1"/>
-              <a:t>dapat</a:t>
-            </a:r>
-            <a:r>
-              <a:rPr lang="en-US" dirty="0"/>
-              <a:t> </a:t>
-            </a:r>
-            <a:r>
-              <a:rPr lang="en-US" dirty="0" err="1"/>
-              <a:t>diexport</a:t>
-            </a:r>
-            <a:r>
-              <a:rPr lang="en-US" dirty="0"/>
-              <a:t> </a:t>
-            </a:r>
-            <a:r>
-              <a:rPr lang="en-US" dirty="0" err="1"/>
-              <a:t>sesuai</a:t>
-            </a:r>
-            <a:r>
-              <a:rPr lang="en-US" dirty="0"/>
-              <a:t> </a:t>
-            </a:r>
-            <a:r>
-              <a:rPr lang="en-US" dirty="0" err="1"/>
-              <a:t>hari</a:t>
-            </a:r>
-            <a:r>
-              <a:rPr lang="en-US" dirty="0"/>
-              <a:t>, </a:t>
-            </a:r>
-            <a:r>
-              <a:rPr lang="en-US" dirty="0" err="1"/>
-              <a:t>bulan</a:t>
-            </a:r>
-            <a:r>
-              <a:rPr lang="en-US" dirty="0"/>
-              <a:t> </a:t>
-            </a:r>
-            <a:r>
-              <a:rPr lang="en-US" dirty="0" err="1"/>
-              <a:t>atau</a:t>
-            </a:r>
-            <a:r>
-              <a:rPr lang="en-US" dirty="0"/>
-              <a:t> </a:t>
-            </a:r>
-            <a:r>
-              <a:rPr lang="en-US" dirty="0" err="1"/>
-              <a:t>tahun</a:t>
-            </a:r>
-            <a:r>
-              <a:rPr lang="en-US" dirty="0"/>
-              <a:t> </a:t>
-            </a:r>
-            <a:r>
-              <a:rPr lang="en-US" dirty="0" err="1"/>
-              <a:t>ke</a:t>
-            </a:r>
-            <a:r>
-              <a:rPr lang="en-US" dirty="0"/>
-              <a:t> </a:t>
-            </a:r>
-            <a:r>
-              <a:rPr lang="en-US" dirty="0" err="1"/>
-              <a:t>bentuk</a:t>
-            </a:r>
-            <a:r>
-              <a:rPr lang="en-US" dirty="0"/>
-              <a:t> csv </a:t>
+              <a:t> leaderboard dan  </a:t>
+            </a:r>
+            <a:r>
+              <a:rPr lang="en-US" dirty="0" err="1"/>
+              <a:t>tambah</a:t>
+            </a:r>
+            <a:r>
+              <a:rPr lang="en-US" dirty="0"/>
+              <a:t> history</a:t>
+            </a:r>
+          </a:p>
+          <a:p>
+            <a:r>
+              <a:rPr lang="en-US" dirty="0"/>
+              <a:t>Pada detail game admin, button yang </a:t>
+            </a:r>
+            <a:r>
+              <a:rPr lang="en-US" dirty="0" err="1"/>
+              <a:t>tersedia</a:t>
+            </a:r>
+            <a:r>
+              <a:rPr lang="en-US" dirty="0"/>
+              <a:t> </a:t>
+            </a:r>
+            <a:r>
+              <a:rPr lang="en-US" dirty="0" err="1"/>
+              <a:t>adalah</a:t>
+            </a:r>
+            <a:r>
+              <a:rPr lang="en-US" dirty="0"/>
+              <a:t> le</a:t>
+            </a:r>
+            <a:r>
+              <a:rPr lang="id-ID" dirty="0"/>
+              <a:t>a</a:t>
+            </a:r>
+            <a:r>
+              <a:rPr lang="en-US" dirty="0" err="1"/>
+              <a:t>derboard</a:t>
             </a:r>
             <a:endParaRPr lang="id-ID" dirty="0"/>
           </a:p>
         </p:txBody>
       </p:sp>
+      <p:pic>
+        <p:nvPicPr>
+          <p:cNvPr id="6" name="Picture 5">
+            <a:extLst>
+              <a:ext uri="{FF2B5EF4-FFF2-40B4-BE49-F238E27FC236}">
+                <a16:creationId xmlns:a16="http://schemas.microsoft.com/office/drawing/2014/main" id="{166AEB96-1A6D-4553-9AD8-36C4069B369A}"/>
+              </a:ext>
+            </a:extLst>
+          </p:cNvPr>
+          <p:cNvPicPr>
+            <a:picLocks noChangeAspect="1"/>
+          </p:cNvPicPr>
+          <p:nvPr/>
+        </p:nvPicPr>
+        <p:blipFill>
+          <a:blip r:embed="rId2">
+            <a:extLst>
+              <a:ext uri="{28A0092B-C50C-407E-A947-70E740481C1C}">
+                <a14:useLocalDpi xmlns:a14="http://schemas.microsoft.com/office/drawing/2010/main" val="0"/>
+              </a:ext>
+            </a:extLst>
+          </a:blip>
+          <a:stretch>
+            <a:fillRect/>
+          </a:stretch>
+        </p:blipFill>
+        <p:spPr>
+          <a:xfrm>
+            <a:off x="0" y="0"/>
+            <a:ext cx="3248526" cy="6858000"/>
+          </a:xfrm>
+          <a:prstGeom prst="rect">
+            <a:avLst/>
+          </a:prstGeom>
+        </p:spPr>
+      </p:pic>
+      <p:pic>
+        <p:nvPicPr>
+          <p:cNvPr id="10" name="Picture 9">
+            <a:extLst>
+              <a:ext uri="{FF2B5EF4-FFF2-40B4-BE49-F238E27FC236}">
+                <a16:creationId xmlns:a16="http://schemas.microsoft.com/office/drawing/2014/main" id="{AC2A0E19-C35B-43C4-8967-EA94580DC047}"/>
+              </a:ext>
+            </a:extLst>
+          </p:cNvPr>
+          <p:cNvPicPr>
+            <a:picLocks noChangeAspect="1"/>
+          </p:cNvPicPr>
+          <p:nvPr/>
+        </p:nvPicPr>
+        <p:blipFill>
+          <a:blip r:embed="rId3">
+            <a:extLst>
+              <a:ext uri="{28A0092B-C50C-407E-A947-70E740481C1C}">
+                <a14:useLocalDpi xmlns:a14="http://schemas.microsoft.com/office/drawing/2010/main" val="0"/>
+              </a:ext>
+            </a:extLst>
+          </a:blip>
+          <a:stretch>
+            <a:fillRect/>
+          </a:stretch>
+        </p:blipFill>
+        <p:spPr>
+          <a:xfrm>
+            <a:off x="8943473" y="0"/>
+            <a:ext cx="3248526" cy="6858000"/>
+          </a:xfrm>
+          <a:prstGeom prst="rect">
+            <a:avLst/>
+          </a:prstGeom>
+        </p:spPr>
+      </p:pic>
     </p:spTree>
     <p:extLst>
       <p:ext uri="{BB962C8B-B14F-4D97-AF65-F5344CB8AC3E}">
-        <p14:creationId xmlns:p14="http://schemas.microsoft.com/office/powerpoint/2010/main" val="3957615520"/>
+        <p14:creationId xmlns:p14="http://schemas.microsoft.com/office/powerpoint/2010/main" val="24565309"/>
       </p:ext>
     </p:extLst>
   </p:cSld>
@@ -6284,7 +7080,7 @@
           <p:cNvPr id="2" name="Title 1">
             <a:extLst>
               <a:ext uri="{FF2B5EF4-FFF2-40B4-BE49-F238E27FC236}">
-                <a16:creationId xmlns:a16="http://schemas.microsoft.com/office/drawing/2014/main" id="{0C58EE55-CA71-40DA-8938-97EEC1C58105}"/>
+                <a16:creationId xmlns:a16="http://schemas.microsoft.com/office/drawing/2014/main" id="{DB1C758F-34C4-4CB2-A59F-F12226BD31A2}"/>
               </a:ext>
             </a:extLst>
           </p:cNvPr>
@@ -6295,18 +7091,20 @@
             <p:ph type="title"/>
           </p:nvPr>
         </p:nvSpPr>
-        <p:spPr/>
+        <p:spPr>
+          <a:xfrm>
+            <a:off x="3376246" y="365125"/>
+            <a:ext cx="5567228" cy="1325563"/>
+          </a:xfrm>
+        </p:spPr>
         <p:txBody>
           <a:bodyPr/>
           <a:lstStyle/>
           <a:p>
-            <a:r>
-              <a:rPr lang="en-US" dirty="0" err="1"/>
-              <a:t>Tambah</a:t>
-            </a:r>
-            <a:r>
-              <a:rPr lang="en-US" dirty="0"/>
-              <a:t> History</a:t>
+            <a:pPr algn="ctr"/>
+            <a:r>
+              <a:rPr lang="en-US" dirty="0"/>
+              <a:t>Leaderboard</a:t>
             </a:r>
             <a:endParaRPr lang="id-ID" dirty="0"/>
           </a:p>
@@ -6317,7 +7115,7 @@
           <p:cNvPr id="3" name="Content Placeholder 2">
             <a:extLst>
               <a:ext uri="{FF2B5EF4-FFF2-40B4-BE49-F238E27FC236}">
-                <a16:creationId xmlns:a16="http://schemas.microsoft.com/office/drawing/2014/main" id="{2A27E5A2-8C7F-4D24-A103-E655C4074461}"/>
+                <a16:creationId xmlns:a16="http://schemas.microsoft.com/office/drawing/2014/main" id="{152C5B50-D56B-41B4-AE64-140DC7E15213}"/>
               </a:ext>
             </a:extLst>
           </p:cNvPr>
@@ -6328,56 +7126,25 @@
             <p:ph idx="1"/>
           </p:nvPr>
         </p:nvSpPr>
-        <p:spPr/>
-        <p:txBody>
-          <a:bodyPr/>
+        <p:spPr>
+          <a:xfrm>
+            <a:off x="3248526" y="1825624"/>
+            <a:ext cx="5694947" cy="5032375"/>
+          </a:xfrm>
+        </p:spPr>
+        <p:txBody>
+          <a:bodyPr>
+            <a:normAutofit fontScale="92500" lnSpcReduction="20000"/>
+          </a:bodyPr>
           <a:lstStyle/>
           <a:p>
             <a:r>
-              <a:rPr lang="en-US" dirty="0" err="1"/>
-              <a:t>Tambah</a:t>
-            </a:r>
-            <a:r>
-              <a:rPr lang="en-US" dirty="0"/>
-              <a:t> history </a:t>
-            </a:r>
-            <a:r>
-              <a:rPr lang="en-US" dirty="0" err="1"/>
-              <a:t>hanya</a:t>
-            </a:r>
-            <a:r>
-              <a:rPr lang="en-US" dirty="0"/>
-              <a:t> </a:t>
-            </a:r>
-            <a:r>
-              <a:rPr lang="en-US" dirty="0" err="1"/>
-              <a:t>ada</a:t>
-            </a:r>
-            <a:r>
-              <a:rPr lang="en-US" dirty="0"/>
-              <a:t> </a:t>
-            </a:r>
-            <a:r>
-              <a:rPr lang="en-US" dirty="0" err="1"/>
-              <a:t>padda</a:t>
-            </a:r>
-            <a:r>
-              <a:rPr lang="en-US" dirty="0"/>
-              <a:t> </a:t>
-            </a:r>
-            <a:r>
-              <a:rPr lang="en-US" dirty="0" err="1"/>
-              <a:t>akses</a:t>
-            </a:r>
-            <a:r>
-              <a:rPr lang="en-US" dirty="0"/>
-              <a:t> level user</a:t>
-            </a:r>
-          </a:p>
-          <a:p>
-            <a:r>
-              <a:rPr lang="en-US" dirty="0" err="1"/>
-              <a:t>Dapat</a:t>
+              <a:rPr lang="en-US" dirty="0"/>
+              <a:t>Pada user dan admin leaderboard </a:t>
+            </a:r>
+            <a:r>
+              <a:rPr lang="en-US" dirty="0" err="1"/>
+              <a:t>dapat</a:t>
             </a:r>
             <a:r>
               <a:rPr lang="en-US" dirty="0"/>
@@ -6393,7 +7160,23 @@
             </a:r>
             <a:r>
               <a:rPr lang="en-US" dirty="0" err="1"/>
-              <a:t>melalui</a:t>
+              <a:t>setelah</a:t>
+            </a:r>
+            <a:r>
+              <a:rPr lang="en-US" dirty="0"/>
+              <a:t> </a:t>
+            </a:r>
+            <a:r>
+              <a:rPr lang="en-US" dirty="0" err="1"/>
+              <a:t>memilih</a:t>
+            </a:r>
+            <a:r>
+              <a:rPr lang="en-US" dirty="0"/>
+              <a:t> game dan </a:t>
+            </a:r>
+            <a:r>
+              <a:rPr lang="en-US" dirty="0" err="1"/>
+              <a:t>melihat</a:t>
             </a:r>
             <a:r>
               <a:rPr lang="en-US" dirty="0"/>
@@ -6403,6 +7186,65 @@
           <a:p>
             <a:r>
               <a:rPr lang="en-US" dirty="0"/>
+              <a:t>Hal </a:t>
+            </a:r>
+            <a:r>
+              <a:rPr lang="en-US" dirty="0" err="1"/>
+              <a:t>ini</a:t>
+            </a:r>
+            <a:r>
+              <a:rPr lang="en-US" dirty="0"/>
+              <a:t> </a:t>
+            </a:r>
+            <a:r>
+              <a:rPr lang="en-US" dirty="0" err="1"/>
+              <a:t>dilakukan</a:t>
+            </a:r>
+            <a:r>
+              <a:rPr lang="en-US" dirty="0"/>
+              <a:t> </a:t>
+            </a:r>
+            <a:r>
+              <a:rPr lang="en-US" dirty="0" err="1"/>
+              <a:t>untuk</a:t>
+            </a:r>
+            <a:r>
+              <a:rPr lang="en-US" dirty="0"/>
+              <a:t> </a:t>
+            </a:r>
+            <a:r>
+              <a:rPr lang="en-US" dirty="0" err="1"/>
+              <a:t>mempermudah</a:t>
+            </a:r>
+            <a:r>
+              <a:rPr lang="en-US" dirty="0"/>
+              <a:t> </a:t>
+            </a:r>
+            <a:r>
+              <a:rPr lang="en-US" dirty="0" err="1"/>
+              <a:t>pendataan</a:t>
+            </a:r>
+            <a:r>
+              <a:rPr lang="en-US" dirty="0"/>
+              <a:t> leaderboard </a:t>
+            </a:r>
+            <a:r>
+              <a:rPr lang="en-US" dirty="0" err="1"/>
+              <a:t>berdasarkan</a:t>
+            </a:r>
+            <a:r>
+              <a:rPr lang="en-US" dirty="0"/>
+              <a:t> game yang </a:t>
+            </a:r>
+            <a:r>
+              <a:rPr lang="en-US" dirty="0" err="1"/>
+              <a:t>sama</a:t>
+            </a:r>
+            <a:endParaRPr lang="en-US" dirty="0"/>
+          </a:p>
+          <a:p>
+            <a:r>
+              <a:rPr lang="en-US" dirty="0"/>
               <a:t>Isi </a:t>
             </a:r>
             <a:r>
@@ -6411,15 +7253,7 @@
             </a:r>
             <a:r>
               <a:rPr lang="en-US" dirty="0"/>
-              <a:t> </a:t>
-            </a:r>
-            <a:r>
-              <a:rPr lang="en-US" dirty="0" err="1"/>
-              <a:t>tambah</a:t>
-            </a:r>
-            <a:r>
-              <a:rPr lang="en-US" dirty="0"/>
-              <a:t> history </a:t>
+              <a:t> leaderboard </a:t>
             </a:r>
             <a:r>
               <a:rPr lang="en-US" dirty="0" err="1"/>
@@ -6431,15 +7265,78 @@
             </a:r>
             <a:r>
               <a:rPr lang="en-US" dirty="0" err="1"/>
-              <a:t>dari</a:t>
-            </a:r>
-            <a:r>
-              <a:rPr lang="en-US" dirty="0"/>
-              <a:t> history </a:t>
-            </a:r>
-            <a:r>
-              <a:rPr lang="en-US" dirty="0" err="1"/>
-              <a:t>permainan</a:t>
+              <a:t>berupa</a:t>
+            </a:r>
+            <a:r>
+              <a:rPr lang="en-US" dirty="0"/>
+              <a:t> </a:t>
+            </a:r>
+            <a:r>
+              <a:rPr lang="en-US" dirty="0" err="1"/>
+              <a:t>nama,menang</a:t>
+            </a:r>
+            <a:r>
+              <a:rPr lang="en-US" dirty="0"/>
+              <a:t>, </a:t>
+            </a:r>
+            <a:r>
+              <a:rPr lang="en-US" dirty="0" err="1"/>
+              <a:t>kalah</a:t>
+            </a:r>
+            <a:r>
+              <a:rPr lang="en-US" dirty="0"/>
+              <a:t>, </a:t>
+            </a:r>
+            <a:r>
+              <a:rPr lang="en-US" dirty="0" err="1"/>
+              <a:t>hari</a:t>
+            </a:r>
+            <a:r>
+              <a:rPr lang="en-US" dirty="0"/>
+              <a:t>, </a:t>
+            </a:r>
+            <a:r>
+              <a:rPr lang="en-US" dirty="0" err="1"/>
+              <a:t>bulan</a:t>
+            </a:r>
+            <a:r>
+              <a:rPr lang="en-US" dirty="0"/>
+              <a:t> dan </a:t>
+            </a:r>
+            <a:r>
+              <a:rPr lang="en-US" dirty="0" err="1"/>
+              <a:t>tahun</a:t>
+            </a:r>
+            <a:endParaRPr lang="en-US" dirty="0"/>
+          </a:p>
+          <a:p>
+            <a:r>
+              <a:rPr lang="en-US" dirty="0"/>
+              <a:t>Isi pada le</a:t>
+            </a:r>
+            <a:r>
+              <a:rPr lang="id-ID" dirty="0"/>
+              <a:t>a</a:t>
+            </a:r>
+            <a:r>
+              <a:rPr lang="en-US" dirty="0" err="1"/>
+              <a:t>derboard</a:t>
+            </a:r>
+            <a:r>
+              <a:rPr lang="en-US" dirty="0"/>
+              <a:t> </a:t>
+            </a:r>
+            <a:r>
+              <a:rPr lang="en-US" dirty="0" err="1"/>
+              <a:t>berupa</a:t>
+            </a:r>
+            <a:r>
+              <a:rPr lang="en-US" dirty="0"/>
+              <a:t> </a:t>
+            </a:r>
+            <a:r>
+              <a:rPr lang="en-US" dirty="0" err="1"/>
+              <a:t>poin</a:t>
             </a:r>
             <a:r>
               <a:rPr lang="en-US" dirty="0"/>
@@ -6447,123 +7344,38 @@
             </a:r>
             <a:r>
               <a:rPr lang="en-US" dirty="0" err="1"/>
-              <a:t>dilakukan</a:t>
+              <a:t>didapatkan</a:t>
+            </a:r>
+            <a:r>
+              <a:rPr lang="en-US" dirty="0"/>
+              <a:t> </a:t>
+            </a:r>
+            <a:r>
+              <a:rPr lang="en-US" dirty="0" err="1"/>
+              <a:t>berdasarkan</a:t>
+            </a:r>
+            <a:r>
+              <a:rPr lang="en-US" dirty="0"/>
+              <a:t> </a:t>
+            </a:r>
+            <a:r>
+              <a:rPr lang="en-US" dirty="0" err="1"/>
+              <a:t>menang</a:t>
+            </a:r>
+            <a:r>
+              <a:rPr lang="en-US" dirty="0"/>
+              <a:t> dan </a:t>
+            </a:r>
+            <a:r>
+              <a:rPr lang="en-US" dirty="0" err="1"/>
+              <a:t>kalah</a:t>
             </a:r>
             <a:endParaRPr lang="en-US" dirty="0"/>
           </a:p>
           <a:p>
             <a:r>
-              <a:rPr lang="en-US" dirty="0" err="1"/>
-              <a:t>Terdapat</a:t>
-            </a:r>
-            <a:r>
-              <a:rPr lang="en-US" dirty="0"/>
-              <a:t> upload </a:t>
-            </a:r>
-            <a:r>
-              <a:rPr lang="en-US" dirty="0" err="1"/>
-              <a:t>gambar</a:t>
-            </a:r>
-            <a:r>
-              <a:rPr lang="en-US" dirty="0"/>
-              <a:t> yang </a:t>
-            </a:r>
-            <a:r>
-              <a:rPr lang="en-US" dirty="0" err="1"/>
-              <a:t>digunakan</a:t>
-            </a:r>
-            <a:r>
-              <a:rPr lang="en-US" dirty="0"/>
-              <a:t> </a:t>
-            </a:r>
-            <a:r>
-              <a:rPr lang="en-US" dirty="0" err="1"/>
-              <a:t>sebagai</a:t>
-            </a:r>
-            <a:r>
-              <a:rPr lang="en-US" dirty="0"/>
-              <a:t> </a:t>
-            </a:r>
-            <a:r>
-              <a:rPr lang="en-US" dirty="0" err="1"/>
-              <a:t>bukti</a:t>
-            </a:r>
-            <a:r>
-              <a:rPr lang="en-US" dirty="0"/>
-              <a:t> </a:t>
-            </a:r>
-            <a:r>
-              <a:rPr lang="en-US" dirty="0" err="1"/>
-              <a:t>kebenaran</a:t>
-            </a:r>
-            <a:endParaRPr lang="en-US" dirty="0"/>
-          </a:p>
-          <a:p>
-            <a:r>
-              <a:rPr lang="en-US" dirty="0"/>
-              <a:t>Setelah </a:t>
-            </a:r>
-            <a:r>
-              <a:rPr lang="en-US" dirty="0" err="1"/>
-              <a:t>diklik</a:t>
-            </a:r>
-            <a:r>
-              <a:rPr lang="en-US" dirty="0"/>
-              <a:t> </a:t>
-            </a:r>
-            <a:r>
-              <a:rPr lang="en-US" dirty="0" err="1"/>
-              <a:t>maka</a:t>
-            </a:r>
-            <a:r>
-              <a:rPr lang="en-US" dirty="0"/>
-              <a:t> </a:t>
-            </a:r>
-            <a:r>
-              <a:rPr lang="en-US" dirty="0" err="1"/>
-              <a:t>akan</a:t>
-            </a:r>
-            <a:r>
-              <a:rPr lang="en-US" dirty="0"/>
-              <a:t> </a:t>
-            </a:r>
-            <a:r>
-              <a:rPr lang="en-US" dirty="0" err="1"/>
-              <a:t>dialihkan</a:t>
-            </a:r>
-            <a:r>
-              <a:rPr lang="en-US" dirty="0"/>
-              <a:t> </a:t>
-            </a:r>
-            <a:r>
-              <a:rPr lang="en-US" dirty="0" err="1"/>
-              <a:t>menuju</a:t>
-            </a:r>
-            <a:r>
-              <a:rPr lang="en-US" dirty="0"/>
-              <a:t> leaderboard</a:t>
-            </a:r>
-          </a:p>
-          <a:p>
-            <a:r>
-              <a:rPr lang="en-US" dirty="0"/>
-              <a:t>Setelah </a:t>
-            </a:r>
-            <a:r>
-              <a:rPr lang="en-US" dirty="0" err="1"/>
-              <a:t>tambah</a:t>
-            </a:r>
-            <a:r>
-              <a:rPr lang="en-US" dirty="0"/>
-              <a:t> history </a:t>
-            </a:r>
-            <a:r>
-              <a:rPr lang="en-US" dirty="0" err="1"/>
-              <a:t>maka</a:t>
-            </a:r>
-            <a:r>
-              <a:rPr lang="en-US" dirty="0"/>
-              <a:t> admin </a:t>
+              <a:rPr lang="en-US" dirty="0"/>
+              <a:t>Pada admin leaderboard </a:t>
             </a:r>
             <a:r>
               <a:rPr lang="en-US" dirty="0" err="1"/>
@@ -6575,36 +7387,148 @@
             </a:r>
             <a:r>
               <a:rPr lang="en-US" dirty="0" err="1"/>
-              <a:t>menyetujui</a:t>
-            </a:r>
-            <a:r>
-              <a:rPr lang="en-US" dirty="0"/>
-              <a:t> </a:t>
-            </a:r>
-            <a:r>
-              <a:rPr lang="en-US" dirty="0" err="1"/>
-              <a:t>ataupun</a:t>
-            </a:r>
-            <a:r>
-              <a:rPr lang="en-US" dirty="0"/>
-              <a:t> </a:t>
-            </a:r>
-            <a:r>
-              <a:rPr lang="en-US" dirty="0" err="1"/>
-              <a:t>menolak</a:t>
-            </a:r>
-            <a:r>
-              <a:rPr lang="en-US" dirty="0"/>
-              <a:t> history</a:t>
+              <a:t>diexport</a:t>
+            </a:r>
+            <a:r>
+              <a:rPr lang="en-US" dirty="0"/>
+              <a:t> </a:t>
+            </a:r>
+            <a:r>
+              <a:rPr lang="en-US" dirty="0" err="1"/>
+              <a:t>sesuai</a:t>
+            </a:r>
+            <a:r>
+              <a:rPr lang="en-US" dirty="0"/>
+              <a:t> </a:t>
+            </a:r>
+            <a:r>
+              <a:rPr lang="en-US" dirty="0" err="1"/>
+              <a:t>hari</a:t>
+            </a:r>
+            <a:r>
+              <a:rPr lang="en-US" dirty="0"/>
+              <a:t>, </a:t>
+            </a:r>
+            <a:r>
+              <a:rPr lang="en-US" dirty="0" err="1"/>
+              <a:t>bulan</a:t>
+            </a:r>
+            <a:r>
+              <a:rPr lang="en-US" dirty="0"/>
+              <a:t> </a:t>
+            </a:r>
+            <a:r>
+              <a:rPr lang="en-US" dirty="0" err="1"/>
+              <a:t>atau</a:t>
+            </a:r>
+            <a:r>
+              <a:rPr lang="en-US" dirty="0"/>
+              <a:t> </a:t>
+            </a:r>
+            <a:r>
+              <a:rPr lang="en-US" dirty="0" err="1"/>
+              <a:t>tahun</a:t>
+            </a:r>
+            <a:r>
+              <a:rPr lang="en-US" dirty="0"/>
+              <a:t> </a:t>
+            </a:r>
+            <a:r>
+              <a:rPr lang="en-US" dirty="0" err="1"/>
+              <a:t>ke</a:t>
+            </a:r>
+            <a:r>
+              <a:rPr lang="en-US" dirty="0"/>
+              <a:t> </a:t>
+            </a:r>
+            <a:r>
+              <a:rPr lang="en-US" dirty="0" err="1"/>
+              <a:t>bentuk</a:t>
+            </a:r>
+            <a:r>
+              <a:rPr lang="en-US" dirty="0"/>
+              <a:t> csv </a:t>
             </a:r>
             <a:endParaRPr lang="id-ID" dirty="0"/>
           </a:p>
         </p:txBody>
       </p:sp>
+      <p:pic>
+        <p:nvPicPr>
+          <p:cNvPr id="11" name="Picture 10">
+            <a:extLst>
+              <a:ext uri="{FF2B5EF4-FFF2-40B4-BE49-F238E27FC236}">
+                <a16:creationId xmlns:a16="http://schemas.microsoft.com/office/drawing/2014/main" id="{D8069D05-1967-48B2-B649-677FDDF08324}"/>
+              </a:ext>
+            </a:extLst>
+          </p:cNvPr>
+          <p:cNvPicPr>
+            <a:picLocks noChangeAspect="1"/>
+          </p:cNvPicPr>
+          <p:nvPr/>
+        </p:nvPicPr>
+        <p:blipFill>
+          <a:blip r:embed="rId2">
+            <a:extLst>
+              <a:ext uri="{28A0092B-C50C-407E-A947-70E740481C1C}">
+                <a14:useLocalDpi xmlns:a14="http://schemas.microsoft.com/office/drawing/2010/main" val="0"/>
+              </a:ext>
+            </a:extLst>
+          </a:blip>
+          <a:stretch>
+            <a:fillRect/>
+          </a:stretch>
+        </p:blipFill>
+        <p:spPr>
+          <a:xfrm>
+            <a:off x="8943473" y="-16566"/>
+            <a:ext cx="3248526" cy="6858000"/>
+          </a:xfrm>
+          <a:prstGeom prst="rect">
+            <a:avLst/>
+          </a:prstGeom>
+        </p:spPr>
+      </p:pic>
+      <p:pic>
+        <p:nvPicPr>
+          <p:cNvPr id="13" name="Picture 12">
+            <a:extLst>
+              <a:ext uri="{FF2B5EF4-FFF2-40B4-BE49-F238E27FC236}">
+                <a16:creationId xmlns:a16="http://schemas.microsoft.com/office/drawing/2014/main" id="{D115995F-EB25-4D12-A1C9-E5C049316BF2}"/>
+              </a:ext>
+            </a:extLst>
+          </p:cNvPr>
+          <p:cNvPicPr>
+            <a:picLocks noChangeAspect="1"/>
+          </p:cNvPicPr>
+          <p:nvPr/>
+        </p:nvPicPr>
+        <p:blipFill>
+          <a:blip r:embed="rId3">
+            <a:extLst>
+              <a:ext uri="{28A0092B-C50C-407E-A947-70E740481C1C}">
+                <a14:useLocalDpi xmlns:a14="http://schemas.microsoft.com/office/drawing/2010/main" val="0"/>
+              </a:ext>
+            </a:extLst>
+          </a:blip>
+          <a:stretch>
+            <a:fillRect/>
+          </a:stretch>
+        </p:blipFill>
+        <p:spPr>
+          <a:xfrm>
+            <a:off x="0" y="0"/>
+            <a:ext cx="3248526" cy="6858000"/>
+          </a:xfrm>
+          <a:prstGeom prst="rect">
+            <a:avLst/>
+          </a:prstGeom>
+        </p:spPr>
+      </p:pic>
     </p:spTree>
     <p:extLst>
       <p:ext uri="{BB962C8B-B14F-4D97-AF65-F5344CB8AC3E}">
-        <p14:creationId xmlns:p14="http://schemas.microsoft.com/office/powerpoint/2010/main" val="3757181856"/>
+        <p14:creationId xmlns:p14="http://schemas.microsoft.com/office/powerpoint/2010/main" val="3957615520"/>
       </p:ext>
     </p:extLst>
   </p:cSld>

</xml_diff>